<commit_message>
Modify JmsAsyncRcv transaction related description based on review comments. #2814
</commit_message>
<xml_diff>
--- a/source/ArchitectureInDetail/MessagingDetail/images_JMS/materialJMS.pptx
+++ b/source/ArchitectureInDetail/MessagingDetail/images_JMS/materialJMS.pptx
@@ -15,7 +15,7 @@
     <p:sldId id="324" r:id="rId6"/>
     <p:sldId id="337" r:id="rId7"/>
     <p:sldId id="329" r:id="rId8"/>
-    <p:sldId id="335" r:id="rId9"/>
+    <p:sldId id="338" r:id="rId9"/>
     <p:sldId id="334" r:id="rId10"/>
     <p:sldId id="336" r:id="rId11"/>
   </p:sldIdLst>
@@ -218,7 +218,7 @@
             <a:fld id="{3BB47352-BF5A-4CD2-B029-996118CD8E01}" type="datetimeFigureOut">
               <a:rPr kumimoji="1" lang="ja-JP" altLang="en-US" smtClean="0"/>
               <a:pPr/>
-              <a:t>2016/8/29</a:t>
+              <a:t>2017/7/7</a:t>
             </a:fld>
             <a:endParaRPr kumimoji="1" lang="ja-JP" altLang="en-US" dirty="0"/>
           </a:p>
@@ -701,7 +701,7 @@
             <a:fld id="{7B9B12EC-6AA0-374B-A2D3-850081A07A26}" type="datetimeFigureOut">
               <a:rPr kumimoji="1" lang="ja-JP" altLang="en-US" smtClean="0"/>
               <a:pPr/>
-              <a:t>2016/8/29</a:t>
+              <a:t>2017/7/7</a:t>
             </a:fld>
             <a:endParaRPr kumimoji="1" lang="ja-JP" altLang="en-US" dirty="0"/>
           </a:p>
@@ -905,7 +905,7 @@
             <a:fld id="{7B9B12EC-6AA0-374B-A2D3-850081A07A26}" type="datetimeFigureOut">
               <a:rPr kumimoji="1" lang="ja-JP" altLang="en-US" smtClean="0"/>
               <a:pPr/>
-              <a:t>2016/8/29</a:t>
+              <a:t>2017/7/7</a:t>
             </a:fld>
             <a:endParaRPr kumimoji="1" lang="ja-JP" altLang="en-US" dirty="0"/>
           </a:p>
@@ -1119,7 +1119,7 @@
             <a:fld id="{7B9B12EC-6AA0-374B-A2D3-850081A07A26}" type="datetimeFigureOut">
               <a:rPr kumimoji="1" lang="ja-JP" altLang="en-US" smtClean="0"/>
               <a:pPr/>
-              <a:t>2016/8/29</a:t>
+              <a:t>2017/7/7</a:t>
             </a:fld>
             <a:endParaRPr kumimoji="1" lang="ja-JP" altLang="en-US" dirty="0"/>
           </a:p>
@@ -1323,7 +1323,7 @@
             <a:fld id="{7B9B12EC-6AA0-374B-A2D3-850081A07A26}" type="datetimeFigureOut">
               <a:rPr kumimoji="1" lang="ja-JP" altLang="en-US" smtClean="0"/>
               <a:pPr/>
-              <a:t>2016/8/29</a:t>
+              <a:t>2017/7/7</a:t>
             </a:fld>
             <a:endParaRPr kumimoji="1" lang="ja-JP" altLang="en-US" dirty="0"/>
           </a:p>
@@ -1571,7 +1571,7 @@
             <a:fld id="{7B9B12EC-6AA0-374B-A2D3-850081A07A26}" type="datetimeFigureOut">
               <a:rPr kumimoji="1" lang="ja-JP" altLang="en-US" smtClean="0"/>
               <a:pPr/>
-              <a:t>2016/8/29</a:t>
+              <a:t>2017/7/7</a:t>
             </a:fld>
             <a:endParaRPr kumimoji="1" lang="ja-JP" altLang="en-US" dirty="0"/>
           </a:p>
@@ -1925,7 +1925,7 @@
             <a:fld id="{7B9B12EC-6AA0-374B-A2D3-850081A07A26}" type="datetimeFigureOut">
               <a:rPr kumimoji="1" lang="ja-JP" altLang="en-US" smtClean="0"/>
               <a:pPr/>
-              <a:t>2016/8/29</a:t>
+              <a:t>2017/7/7</a:t>
             </a:fld>
             <a:endParaRPr kumimoji="1" lang="ja-JP" altLang="en-US" dirty="0"/>
           </a:p>
@@ -2413,7 +2413,7 @@
             <a:fld id="{7B9B12EC-6AA0-374B-A2D3-850081A07A26}" type="datetimeFigureOut">
               <a:rPr kumimoji="1" lang="ja-JP" altLang="en-US" smtClean="0"/>
               <a:pPr/>
-              <a:t>2016/8/29</a:t>
+              <a:t>2017/7/7</a:t>
             </a:fld>
             <a:endParaRPr kumimoji="1" lang="ja-JP" altLang="en-US" dirty="0"/>
           </a:p>
@@ -2533,7 +2533,7 @@
             <a:fld id="{7B9B12EC-6AA0-374B-A2D3-850081A07A26}" type="datetimeFigureOut">
               <a:rPr kumimoji="1" lang="ja-JP" altLang="en-US" smtClean="0"/>
               <a:pPr/>
-              <a:t>2016/8/29</a:t>
+              <a:t>2017/7/7</a:t>
             </a:fld>
             <a:endParaRPr kumimoji="1" lang="ja-JP" altLang="en-US" dirty="0"/>
           </a:p>
@@ -2630,7 +2630,7 @@
             <a:fld id="{7B9B12EC-6AA0-374B-A2D3-850081A07A26}" type="datetimeFigureOut">
               <a:rPr kumimoji="1" lang="ja-JP" altLang="en-US" smtClean="0"/>
               <a:pPr/>
-              <a:t>2016/8/29</a:t>
+              <a:t>2017/7/7</a:t>
             </a:fld>
             <a:endParaRPr kumimoji="1" lang="ja-JP" altLang="en-US" dirty="0"/>
           </a:p>
@@ -2941,7 +2941,7 @@
             <a:fld id="{7B9B12EC-6AA0-374B-A2D3-850081A07A26}" type="datetimeFigureOut">
               <a:rPr kumimoji="1" lang="ja-JP" altLang="en-US" smtClean="0"/>
               <a:pPr/>
-              <a:t>2016/8/29</a:t>
+              <a:t>2017/7/7</a:t>
             </a:fld>
             <a:endParaRPr kumimoji="1" lang="ja-JP" altLang="en-US" dirty="0"/>
           </a:p>
@@ -3196,7 +3196,7 @@
             <a:fld id="{7B9B12EC-6AA0-374B-A2D3-850081A07A26}" type="datetimeFigureOut">
               <a:rPr kumimoji="1" lang="ja-JP" altLang="en-US" smtClean="0"/>
               <a:pPr/>
-              <a:t>2016/8/29</a:t>
+              <a:t>2017/7/7</a:t>
             </a:fld>
             <a:endParaRPr kumimoji="1" lang="ja-JP" altLang="en-US" dirty="0"/>
           </a:p>
@@ -3443,7 +3443,7 @@
             <a:fld id="{7B9B12EC-6AA0-374B-A2D3-850081A07A26}" type="datetimeFigureOut">
               <a:rPr kumimoji="1" lang="ja-JP" altLang="en-US" smtClean="0"/>
               <a:pPr/>
-              <a:t>2016/8/29</a:t>
+              <a:t>2017/7/7</a:t>
             </a:fld>
             <a:endParaRPr kumimoji="1" lang="ja-JP" altLang="en-US" dirty="0"/>
           </a:p>
@@ -14571,6 +14571,13 @@
   <p:clrMapOvr>
     <a:masterClrMapping/>
   </p:clrMapOvr>
+  <p:timing>
+    <p:tnLst>
+      <p:par>
+        <p:cTn id="1" dur="indefinite" restart="never" nodeType="tmRoot"/>
+      </p:par>
+    </p:tnLst>
+  </p:timing>
 </p:sld>
 </file>
 
@@ -14599,12 +14606,15 @@
         </p:nvSpPr>
         <p:spPr>
           <a:xfrm>
-            <a:off x="4343016" y="1107830"/>
-            <a:ext cx="2614832" cy="2065637"/>
+            <a:off x="-161365" y="951345"/>
+            <a:ext cx="2206576" cy="3028968"/>
           </a:xfrm>
           <a:prstGeom prst="roundRect">
             <a:avLst/>
           </a:prstGeom>
+          <a:solidFill>
+            <a:srgbClr val="92D050"/>
+          </a:solidFill>
         </p:spPr>
         <p:style>
           <a:lnRef idx="1">
@@ -14626,21 +14636,18 @@
           <a:p>
             <a:pPr algn="ctr"/>
             <a:r>
-              <a:rPr lang="en-US" altLang="ja-JP" sz="2000" b="1" dirty="0">
-                <a:solidFill>
-                  <a:schemeClr val="bg1"/>
-                </a:solidFill>
+              <a:rPr lang="en-US" altLang="ja-JP" dirty="0" err="1" smtClean="0">
                 <a:effectLst>
-                  <a:outerShdw blurRad="50800" dist="38100" dir="2700000" algn="tl" rotWithShape="0">
-                    <a:prstClr val="black">
-                      <a:alpha val="40000"/>
-                    </a:prstClr>
+                  <a:outerShdw blurRad="38100" dist="38100" dir="2700000" algn="tl">
+                    <a:srgbClr val="000000">
+                      <a:alpha val="43137"/>
+                    </a:srgbClr>
                   </a:outerShdw>
                 </a:effectLst>
               </a:rPr>
-              <a:t>MessageListener</a:t>
-            </a:r>
-            <a:endParaRPr kumimoji="1" lang="en-US" altLang="ja-JP" sz="2000" b="1" dirty="0" smtClean="0">
+              <a:t>DefaultMessage</a:t>
+            </a:r>
+            <a:endParaRPr lang="en-US" altLang="ja-JP" dirty="0" smtClean="0">
               <a:effectLst>
                 <a:outerShdw blurRad="38100" dist="38100" dir="2700000" algn="tl">
                   <a:srgbClr val="000000">
@@ -14652,39 +14659,196 @@
           </a:p>
           <a:p>
             <a:pPr algn="ctr"/>
-            <a:endParaRPr lang="en-US" altLang="ja-JP" sz="1600" dirty="0"/>
-          </a:p>
-          <a:p>
-            <a:pPr algn="ctr"/>
-            <a:endParaRPr lang="en-US" altLang="ja-JP" sz="1100" dirty="0" smtClean="0"/>
+            <a:r>
+              <a:rPr lang="en-US" altLang="ja-JP" dirty="0" err="1" smtClean="0">
+                <a:effectLst>
+                  <a:outerShdw blurRad="38100" dist="38100" dir="2700000" algn="tl">
+                    <a:srgbClr val="000000">
+                      <a:alpha val="43137"/>
+                    </a:srgbClr>
+                  </a:outerShdw>
+                </a:effectLst>
+              </a:rPr>
+              <a:t>ListenerContainer</a:t>
+            </a:r>
+            <a:endParaRPr lang="ja-JP" altLang="en-US" dirty="0">
+              <a:effectLst>
+                <a:outerShdw blurRad="38100" dist="38100" dir="2700000" algn="tl">
+                  <a:srgbClr val="000000">
+                    <a:alpha val="43137"/>
+                  </a:srgbClr>
+                </a:outerShdw>
+              </a:effectLst>
+            </a:endParaRPr>
           </a:p>
         </p:txBody>
       </p:sp>
       <p:sp>
         <p:nvSpPr>
-          <p:cNvPr id="60" name="正方形/長方形 59"/>
+          <p:cNvPr id="57" name="テキスト ボックス 56"/>
+          <p:cNvSpPr txBox="1"/>
+          <p:nvPr/>
+        </p:nvSpPr>
+        <p:spPr>
+          <a:xfrm>
+            <a:off x="5835605" y="1819016"/>
+            <a:ext cx="2604590" cy="338554"/>
+          </a:xfrm>
+          <a:prstGeom prst="rect">
+            <a:avLst/>
+          </a:prstGeom>
+          <a:noFill/>
+          <a:ln>
+            <a:noFill/>
+          </a:ln>
+        </p:spPr>
+        <p:txBody>
+          <a:bodyPr vert="horz" wrap="square" rtlCol="0">
+            <a:spAutoFit/>
+          </a:bodyPr>
+          <a:lstStyle/>
+          <a:p>
+            <a:r>
+              <a:rPr kumimoji="1" lang="en-US" altLang="ja-JP" sz="1600" dirty="0" smtClean="0">
+                <a:solidFill>
+                  <a:schemeClr val="accent1"/>
+                </a:solidFill>
+              </a:rPr>
+              <a:t>DB</a:t>
+            </a:r>
+            <a:r>
+              <a:rPr lang="ja-JP" altLang="en-US" sz="1600" dirty="0">
+                <a:solidFill>
+                  <a:schemeClr val="accent1"/>
+                </a:solidFill>
+              </a:rPr>
+              <a:t> </a:t>
+            </a:r>
+            <a:r>
+              <a:rPr lang="en-US" altLang="ja-JP" sz="1600" dirty="0" smtClean="0">
+                <a:solidFill>
+                  <a:schemeClr val="accent1"/>
+                </a:solidFill>
+              </a:rPr>
+              <a:t>Transaction</a:t>
+            </a:r>
+            <a:r>
+              <a:rPr lang="ja-JP" altLang="en-US" sz="1600" dirty="0" smtClean="0">
+                <a:solidFill>
+                  <a:schemeClr val="accent1"/>
+                </a:solidFill>
+              </a:rPr>
+              <a:t> </a:t>
+            </a:r>
+            <a:r>
+              <a:rPr lang="en-US" altLang="ja-JP" sz="1600" dirty="0" smtClean="0">
+                <a:solidFill>
+                  <a:schemeClr val="accent1"/>
+                </a:solidFill>
+              </a:rPr>
+              <a:t>Boundary</a:t>
+            </a:r>
+            <a:endParaRPr lang="ja-JP" altLang="en-US" sz="1600" dirty="0">
+              <a:solidFill>
+                <a:schemeClr val="accent1"/>
+              </a:solidFill>
+            </a:endParaRPr>
+          </a:p>
+        </p:txBody>
+      </p:sp>
+      <p:sp>
+        <p:nvSpPr>
+          <p:cNvPr id="58" name="テキスト ボックス 57"/>
+          <p:cNvSpPr txBox="1"/>
+          <p:nvPr/>
+        </p:nvSpPr>
+        <p:spPr>
+          <a:xfrm>
+            <a:off x="5809173" y="1261054"/>
+            <a:ext cx="2623715" cy="338554"/>
+          </a:xfrm>
+          <a:prstGeom prst="rect">
+            <a:avLst/>
+          </a:prstGeom>
+          <a:noFill/>
+          <a:ln>
+            <a:noFill/>
+          </a:ln>
+        </p:spPr>
+        <p:txBody>
+          <a:bodyPr vert="horz" wrap="square" rtlCol="0">
+            <a:spAutoFit/>
+          </a:bodyPr>
+          <a:lstStyle/>
+          <a:p>
+            <a:r>
+              <a:rPr lang="en-US" altLang="ja-JP" sz="1600" dirty="0" smtClean="0">
+                <a:solidFill>
+                  <a:srgbClr val="7030A0"/>
+                </a:solidFill>
+              </a:rPr>
+              <a:t>JMS</a:t>
+            </a:r>
+            <a:r>
+              <a:rPr kumimoji="1" lang="ja-JP" altLang="en-US" sz="1600" dirty="0" smtClean="0">
+                <a:solidFill>
+                  <a:srgbClr val="7030A0"/>
+                </a:solidFill>
+              </a:rPr>
+              <a:t> </a:t>
+            </a:r>
+            <a:r>
+              <a:rPr kumimoji="1" lang="en-US" altLang="ja-JP" sz="1600" dirty="0" smtClean="0">
+                <a:solidFill>
+                  <a:srgbClr val="7030A0"/>
+                </a:solidFill>
+              </a:rPr>
+              <a:t>Transaction</a:t>
+            </a:r>
+            <a:r>
+              <a:rPr kumimoji="1" lang="ja-JP" altLang="en-US" sz="1600" dirty="0" smtClean="0">
+                <a:solidFill>
+                  <a:srgbClr val="7030A0"/>
+                </a:solidFill>
+              </a:rPr>
+              <a:t> </a:t>
+            </a:r>
+            <a:r>
+              <a:rPr lang="en-US" altLang="ja-JP" sz="1600" dirty="0" smtClean="0">
+                <a:solidFill>
+                  <a:srgbClr val="7030A0"/>
+                </a:solidFill>
+              </a:rPr>
+              <a:t>Boundary</a:t>
+            </a:r>
+            <a:endParaRPr kumimoji="1" lang="ja-JP" altLang="en-US" sz="1600" dirty="0">
+              <a:solidFill>
+                <a:srgbClr val="7030A0"/>
+              </a:solidFill>
+            </a:endParaRPr>
+          </a:p>
+        </p:txBody>
+      </p:sp>
+      <p:sp>
+        <p:nvSpPr>
+          <p:cNvPr id="40" name="角丸四角形 39"/>
           <p:cNvSpPr/>
           <p:nvPr/>
         </p:nvSpPr>
         <p:spPr>
           <a:xfrm>
-            <a:off x="2307690" y="1832860"/>
-            <a:ext cx="4504590" cy="895809"/>
+            <a:off x="2835393" y="951345"/>
+            <a:ext cx="2614832" cy="3028968"/>
           </a:xfrm>
-          <a:prstGeom prst="rect">
+          <a:prstGeom prst="roundRect">
             <a:avLst/>
           </a:prstGeom>
           <a:solidFill>
-            <a:schemeClr val="accent2">
-              <a:lumMod val="75000"/>
-              <a:alpha val="17000"/>
+            <a:schemeClr val="accent4">
+              <a:lumMod val="60000"/>
+              <a:lumOff val="40000"/>
             </a:schemeClr>
           </a:solidFill>
-          <a:ln>
-            <a:solidFill>
-              <a:schemeClr val="tx1"/>
-            </a:solidFill>
-          </a:ln>
         </p:spPr>
         <p:style>
           <a:lnRef idx="1">
@@ -14701,194 +14865,26 @@
           </a:fontRef>
         </p:style>
         <p:txBody>
-          <a:bodyPr rtlCol="0" anchor="ctr"/>
+          <a:bodyPr rtlCol="0" anchor="t"/>
           <a:lstStyle/>
           <a:p>
             <a:pPr algn="ctr"/>
-            <a:endParaRPr kumimoji="1" lang="ja-JP" altLang="en-US" dirty="0"/>
-          </a:p>
-        </p:txBody>
-      </p:sp>
-      <p:sp>
-        <p:nvSpPr>
-          <p:cNvPr id="57" name="テキスト ボックス 56"/>
-          <p:cNvSpPr txBox="1"/>
-          <p:nvPr/>
-        </p:nvSpPr>
-        <p:spPr>
-          <a:xfrm>
-            <a:off x="3401508" y="1135168"/>
-            <a:ext cx="1320440" cy="430887"/>
-          </a:xfrm>
-          <a:prstGeom prst="rect">
-            <a:avLst/>
-          </a:prstGeom>
-          <a:noFill/>
-          <a:ln>
-            <a:noFill/>
-          </a:ln>
-        </p:spPr>
-        <p:txBody>
-          <a:bodyPr vert="horz" wrap="square" rtlCol="0">
-            <a:spAutoFit/>
-          </a:bodyPr>
-          <a:lstStyle/>
-          <a:p>
-            <a:r>
-              <a:rPr kumimoji="1" lang="en-US" altLang="ja-JP" sz="1100" dirty="0" smtClean="0">
+            <a:r>
+              <a:rPr lang="en-US" altLang="ja-JP" b="1" dirty="0" err="1" smtClean="0">
                 <a:solidFill>
-                  <a:schemeClr val="accent1"/>
+                  <a:schemeClr val="bg1"/>
                 </a:solidFill>
+                <a:effectLst>
+                  <a:outerShdw blurRad="50800" dist="38100" dir="2700000" algn="tl" rotWithShape="0">
+                    <a:prstClr val="black">
+                      <a:alpha val="40000"/>
+                    </a:prstClr>
+                  </a:outerShdw>
+                </a:effectLst>
               </a:rPr>
-              <a:t>DB</a:t>
-            </a:r>
-            <a:r>
-              <a:rPr lang="ja-JP" altLang="en-US" sz="1100" dirty="0">
-                <a:solidFill>
-                  <a:schemeClr val="accent1"/>
-                </a:solidFill>
-              </a:rPr>
-              <a:t> </a:t>
-            </a:r>
-            <a:r>
-              <a:rPr lang="en-US" altLang="ja-JP" sz="1100" dirty="0" smtClean="0">
-                <a:solidFill>
-                  <a:schemeClr val="accent1"/>
-                </a:solidFill>
-              </a:rPr>
-              <a:t>Transaction</a:t>
-            </a:r>
-          </a:p>
-          <a:p>
-            <a:r>
-              <a:rPr lang="en-US" altLang="ja-JP" sz="1100" dirty="0" smtClean="0">
-                <a:solidFill>
-                  <a:schemeClr val="accent1"/>
-                </a:solidFill>
-              </a:rPr>
-              <a:t>Boundary</a:t>
-            </a:r>
-            <a:endParaRPr lang="ja-JP" altLang="en-US" sz="1100" dirty="0">
-              <a:solidFill>
-                <a:schemeClr val="accent1"/>
-              </a:solidFill>
-            </a:endParaRPr>
-          </a:p>
-        </p:txBody>
-      </p:sp>
-      <p:sp>
-        <p:nvSpPr>
-          <p:cNvPr id="58" name="テキスト ボックス 57"/>
-          <p:cNvSpPr txBox="1"/>
-          <p:nvPr/>
-        </p:nvSpPr>
-        <p:spPr>
-          <a:xfrm>
-            <a:off x="1556110" y="1103707"/>
-            <a:ext cx="1320440" cy="430887"/>
-          </a:xfrm>
-          <a:prstGeom prst="rect">
-            <a:avLst/>
-          </a:prstGeom>
-          <a:noFill/>
-          <a:ln>
-            <a:noFill/>
-          </a:ln>
-        </p:spPr>
-        <p:txBody>
-          <a:bodyPr vert="horz" wrap="square" rtlCol="0">
-            <a:spAutoFit/>
-          </a:bodyPr>
-          <a:lstStyle/>
-          <a:p>
-            <a:r>
-              <a:rPr lang="en-US" altLang="ja-JP" sz="1100" dirty="0" smtClean="0">
-                <a:solidFill>
-                  <a:srgbClr val="7030A0"/>
-                </a:solidFill>
-              </a:rPr>
-              <a:t>JMS</a:t>
-            </a:r>
-            <a:r>
-              <a:rPr kumimoji="1" lang="ja-JP" altLang="en-US" sz="1100" dirty="0" smtClean="0">
-                <a:solidFill>
-                  <a:srgbClr val="7030A0"/>
-                </a:solidFill>
-              </a:rPr>
-              <a:t> </a:t>
-            </a:r>
-            <a:r>
-              <a:rPr kumimoji="1" lang="en-US" altLang="ja-JP" sz="1100" dirty="0" smtClean="0">
-                <a:solidFill>
-                  <a:srgbClr val="7030A0"/>
-                </a:solidFill>
-              </a:rPr>
-              <a:t>Transaction </a:t>
-            </a:r>
-          </a:p>
-          <a:p>
-            <a:r>
-              <a:rPr lang="en-US" altLang="ja-JP" sz="1100" dirty="0" smtClean="0">
-                <a:solidFill>
-                  <a:srgbClr val="7030A0"/>
-                </a:solidFill>
-              </a:rPr>
-              <a:t>Boundary</a:t>
-            </a:r>
-            <a:endParaRPr kumimoji="1" lang="ja-JP" altLang="en-US" sz="1100" dirty="0">
-              <a:solidFill>
-                <a:srgbClr val="7030A0"/>
-              </a:solidFill>
-            </a:endParaRPr>
-          </a:p>
-        </p:txBody>
-      </p:sp>
-      <p:sp>
-        <p:nvSpPr>
-          <p:cNvPr id="40" name="角丸四角形 39"/>
-          <p:cNvSpPr/>
-          <p:nvPr/>
-        </p:nvSpPr>
-        <p:spPr>
-          <a:xfrm>
-            <a:off x="349250" y="1931421"/>
-            <a:ext cx="1690907" cy="759832"/>
-          </a:xfrm>
-          <a:prstGeom prst="roundRect">
-            <a:avLst/>
-          </a:prstGeom>
-        </p:spPr>
-        <p:style>
-          <a:lnRef idx="1">
-            <a:schemeClr val="accent1"/>
-          </a:lnRef>
-          <a:fillRef idx="3">
-            <a:schemeClr val="accent1"/>
-          </a:fillRef>
-          <a:effectRef idx="2">
-            <a:schemeClr val="accent1"/>
-          </a:effectRef>
-          <a:fontRef idx="minor">
-            <a:schemeClr val="lt1"/>
-          </a:fontRef>
-        </p:style>
-        <p:txBody>
-          <a:bodyPr rtlCol="0" anchor="ctr"/>
-          <a:lstStyle/>
-          <a:p>
-            <a:pPr algn="ctr"/>
-            <a:r>
-              <a:rPr kumimoji="1" lang="en-US" altLang="ja-JP" sz="1100" dirty="0" smtClean="0"/>
-              <a:t>DefaultMessageListener</a:t>
-            </a:r>
-          </a:p>
-          <a:p>
-            <a:pPr algn="ctr"/>
-            <a:r>
-              <a:rPr kumimoji="1" lang="en-US" altLang="ja-JP" sz="1100" dirty="0" smtClean="0"/>
-              <a:t>Container</a:t>
-            </a:r>
-            <a:endParaRPr kumimoji="1" lang="ja-JP" altLang="en-US" sz="1100" dirty="0"/>
+              <a:t>MessageListener</a:t>
+            </a:r>
+            <a:endParaRPr lang="en-US" altLang="ja-JP" sz="1050" dirty="0"/>
           </a:p>
         </p:txBody>
       </p:sp>
@@ -14899,142 +14895,18 @@
           <p:nvPr/>
         </p:nvCxnSpPr>
         <p:spPr>
-          <a:xfrm flipV="1">
-            <a:off x="2040157" y="2064673"/>
-            <a:ext cx="2290431" cy="18617"/>
+          <a:xfrm>
+            <a:off x="2046722" y="1725669"/>
+            <a:ext cx="788671" cy="2255"/>
           </a:xfrm>
           <a:prstGeom prst="straightConnector1">
             <a:avLst/>
           </a:prstGeom>
           <a:ln>
+            <a:solidFill>
+              <a:schemeClr val="accent4"/>
+            </a:solidFill>
             <a:tailEnd type="arrow"/>
-          </a:ln>
-        </p:spPr>
-        <p:style>
-          <a:lnRef idx="2">
-            <a:schemeClr val="accent1"/>
-          </a:lnRef>
-          <a:fillRef idx="0">
-            <a:schemeClr val="accent1"/>
-          </a:fillRef>
-          <a:effectRef idx="1">
-            <a:schemeClr val="accent1"/>
-          </a:effectRef>
-          <a:fontRef idx="minor">
-            <a:schemeClr val="tx1"/>
-          </a:fontRef>
-        </p:style>
-      </p:cxnSp>
-      <p:sp>
-        <p:nvSpPr>
-          <p:cNvPr id="51" name="正方形/長方形 50"/>
-          <p:cNvSpPr/>
-          <p:nvPr/>
-        </p:nvSpPr>
-        <p:spPr>
-          <a:xfrm>
-            <a:off x="4165600" y="1882091"/>
-            <a:ext cx="2578099" cy="797236"/>
-          </a:xfrm>
-          <a:prstGeom prst="rect">
-            <a:avLst/>
-          </a:prstGeom>
-          <a:solidFill>
-            <a:schemeClr val="accent1">
-              <a:alpha val="11000"/>
-            </a:schemeClr>
-          </a:solidFill>
-          <a:ln>
-            <a:solidFill>
-              <a:schemeClr val="tx1"/>
-            </a:solidFill>
-          </a:ln>
-        </p:spPr>
-        <p:style>
-          <a:lnRef idx="1">
-            <a:schemeClr val="accent1"/>
-          </a:lnRef>
-          <a:fillRef idx="3">
-            <a:schemeClr val="accent1"/>
-          </a:fillRef>
-          <a:effectRef idx="2">
-            <a:schemeClr val="accent1"/>
-          </a:effectRef>
-          <a:fontRef idx="minor">
-            <a:schemeClr val="lt1"/>
-          </a:fontRef>
-        </p:style>
-        <p:txBody>
-          <a:bodyPr rtlCol="0" anchor="ctr"/>
-          <a:lstStyle/>
-          <a:p>
-            <a:pPr algn="ctr"/>
-            <a:endParaRPr kumimoji="1" lang="ja-JP" altLang="en-US" dirty="0"/>
-          </a:p>
-        </p:txBody>
-      </p:sp>
-      <p:cxnSp>
-        <p:nvCxnSpPr>
-          <p:cNvPr id="29" name="直線矢印コネクタ 28"/>
-          <p:cNvCxnSpPr/>
-          <p:nvPr/>
-        </p:nvCxnSpPr>
-        <p:spPr>
-          <a:xfrm>
-            <a:off x="4153088" y="1450768"/>
-            <a:ext cx="9269" cy="1395571"/>
-          </a:xfrm>
-          <a:prstGeom prst="straightConnector1">
-            <a:avLst/>
-          </a:prstGeom>
-          <a:ln w="31750">
-            <a:solidFill>
-              <a:schemeClr val="tx2">
-                <a:lumMod val="60000"/>
-                <a:lumOff val="40000"/>
-              </a:schemeClr>
-            </a:solidFill>
-            <a:prstDash val="dash"/>
-            <a:headEnd type="none"/>
-            <a:tailEnd type="none"/>
-          </a:ln>
-        </p:spPr>
-        <p:style>
-          <a:lnRef idx="2">
-            <a:schemeClr val="accent1"/>
-          </a:lnRef>
-          <a:fillRef idx="0">
-            <a:schemeClr val="accent1"/>
-          </a:fillRef>
-          <a:effectRef idx="1">
-            <a:schemeClr val="accent1"/>
-          </a:effectRef>
-          <a:fontRef idx="minor">
-            <a:schemeClr val="tx1"/>
-          </a:fontRef>
-        </p:style>
-      </p:cxnSp>
-      <p:cxnSp>
-        <p:nvCxnSpPr>
-          <p:cNvPr id="43" name="直線矢印コネクタ 42"/>
-          <p:cNvCxnSpPr/>
-          <p:nvPr/>
-        </p:nvCxnSpPr>
-        <p:spPr>
-          <a:xfrm>
-            <a:off x="2302730" y="1462136"/>
-            <a:ext cx="0" cy="1459163"/>
-          </a:xfrm>
-          <a:prstGeom prst="straightConnector1">
-            <a:avLst/>
-          </a:prstGeom>
-          <a:ln w="31750">
-            <a:solidFill>
-              <a:srgbClr val="7030A0"/>
-            </a:solidFill>
-            <a:prstDash val="dash"/>
-            <a:headEnd type="none"/>
-            <a:tailEnd type="none" w="sm" len="sm"/>
           </a:ln>
         </p:spPr>
         <p:style>
@@ -15060,7 +14932,7 @@
         </p:nvSpPr>
         <p:spPr>
           <a:xfrm>
-            <a:off x="4493484" y="2838723"/>
+            <a:off x="5896901" y="3738661"/>
             <a:ext cx="1284243" cy="410117"/>
           </a:xfrm>
           <a:prstGeom prst="borderCallout2">
@@ -15069,8 +14941,8 @@
               <a:gd name="adj2" fmla="val 567"/>
               <a:gd name="adj3" fmla="val 18750"/>
               <a:gd name="adj4" fmla="val -16667"/>
-              <a:gd name="adj5" fmla="val -24153"/>
-              <a:gd name="adj6" fmla="val -26032"/>
+              <a:gd name="adj5" fmla="val -123247"/>
+              <a:gd name="adj6" fmla="val -17132"/>
             </a:avLst>
           </a:prstGeom>
           <a:solidFill>
@@ -15144,7 +15016,7 @@
         </p:nvSpPr>
         <p:spPr>
           <a:xfrm>
-            <a:off x="2607913" y="2838724"/>
+            <a:off x="2446532" y="4164930"/>
             <a:ext cx="1373883" cy="410117"/>
           </a:xfrm>
           <a:prstGeom prst="borderCallout2">
@@ -15153,8 +15025,8 @@
               <a:gd name="adj2" fmla="val -620"/>
               <a:gd name="adj3" fmla="val 18750"/>
               <a:gd name="adj4" fmla="val -16667"/>
-              <a:gd name="adj5" fmla="val -12611"/>
-              <a:gd name="adj6" fmla="val -23983"/>
+              <a:gd name="adj5" fmla="val -74545"/>
+              <a:gd name="adj6" fmla="val -17512"/>
             </a:avLst>
           </a:prstGeom>
           <a:solidFill>
@@ -15235,14 +15107,17 @@
           <p:nvPr/>
         </p:nvCxnSpPr>
         <p:spPr>
-          <a:xfrm flipV="1">
-            <a:off x="2011525" y="2571527"/>
-            <a:ext cx="2347693" cy="1641"/>
+          <a:xfrm>
+            <a:off x="2046722" y="3419520"/>
+            <a:ext cx="788671" cy="0"/>
           </a:xfrm>
           <a:prstGeom prst="straightConnector1">
             <a:avLst/>
           </a:prstGeom>
           <a:ln>
+            <a:solidFill>
+              <a:schemeClr val="accent4"/>
+            </a:solidFill>
             <a:headEnd type="arrow"/>
             <a:tailEnd type="none"/>
           </a:ln>
@@ -15270,8 +15145,8 @@
         </p:nvSpPr>
         <p:spPr>
           <a:xfrm>
-            <a:off x="4292916" y="1641157"/>
-            <a:ext cx="2297424" cy="1107996"/>
+            <a:off x="2829289" y="1361474"/>
+            <a:ext cx="2664832" cy="2092881"/>
           </a:xfrm>
           <a:prstGeom prst="rect">
             <a:avLst/>
@@ -15285,98 +15160,56 @@
           <a:lstStyle/>
           <a:p>
             <a:r>
-              <a:rPr lang="en-US" altLang="ja-JP" sz="1100" dirty="0" smtClean="0"/>
+              <a:rPr lang="en-US" altLang="ja-JP" sz="1300" dirty="0" smtClean="0"/>
               <a:t>@JmsListener(…)</a:t>
             </a:r>
           </a:p>
           <a:p>
             <a:r>
-              <a:rPr lang="en-US" altLang="ja-JP" sz="1100" dirty="0" smtClean="0"/>
+              <a:rPr lang="en-US" altLang="ja-JP" sz="1300" dirty="0" smtClean="0"/>
               <a:t>public void receiveTodo(Todo </a:t>
             </a:r>
             <a:r>
-              <a:rPr lang="en-US" altLang="ja-JP" sz="1100" dirty="0"/>
+              <a:rPr lang="en-US" altLang="ja-JP" sz="1300" dirty="0"/>
               <a:t>todo) {</a:t>
             </a:r>
           </a:p>
           <a:p>
-            <a:r>
-              <a:rPr lang="en-US" altLang="ja-JP" sz="1100" dirty="0" smtClean="0"/>
+            <a:endParaRPr lang="en-US" altLang="ja-JP" sz="1300" dirty="0"/>
+          </a:p>
+          <a:p>
+            <a:r>
+              <a:rPr lang="en-US" altLang="ja-JP" sz="1300" dirty="0" smtClean="0"/>
               <a:t>    // omitted</a:t>
             </a:r>
           </a:p>
           <a:p>
             <a:r>
-              <a:rPr lang="en-US" altLang="ja-JP" sz="1100" dirty="0" smtClean="0"/>
+              <a:rPr lang="en-US" altLang="ja-JP" sz="1300" dirty="0" smtClean="0"/>
               <a:t>    todoService.insertTodo(todo)</a:t>
             </a:r>
           </a:p>
           <a:p>
-            <a:r>
-              <a:rPr lang="en-US" altLang="ja-JP" sz="1100" dirty="0" smtClean="0"/>
-              <a:t>    // </a:t>
-            </a:r>
-            <a:r>
-              <a:rPr lang="en-US" altLang="ja-JP" sz="1100" dirty="0"/>
-              <a:t>omitted</a:t>
-            </a:r>
-          </a:p>
-          <a:p>
-            <a:r>
-              <a:rPr lang="en-US" altLang="ja-JP" sz="1100" dirty="0" smtClean="0"/>
+            <a:endParaRPr lang="en-US" altLang="ja-JP" sz="1300" dirty="0" smtClean="0"/>
+          </a:p>
+          <a:p>
+            <a:endParaRPr lang="en-US" altLang="ja-JP" sz="1300" dirty="0" smtClean="0"/>
+          </a:p>
+          <a:p>
+            <a:r>
+              <a:rPr lang="en-US" altLang="ja-JP" sz="1300" dirty="0" smtClean="0"/>
+              <a:t>    // omitted</a:t>
+            </a:r>
+          </a:p>
+          <a:p>
+            <a:endParaRPr lang="en-US" altLang="ja-JP" sz="1300" dirty="0"/>
+          </a:p>
+          <a:p>
+            <a:r>
+              <a:rPr lang="en-US" altLang="ja-JP" sz="1300" dirty="0" smtClean="0"/>
               <a:t>}</a:t>
             </a:r>
-            <a:endParaRPr kumimoji="1" lang="ja-JP" altLang="en-US" sz="1100" dirty="0"/>
-          </a:p>
-        </p:txBody>
-      </p:sp>
-      <p:sp>
-        <p:nvSpPr>
-          <p:cNvPr id="64" name="テキスト ボックス 63"/>
-          <p:cNvSpPr txBox="1"/>
-          <p:nvPr/>
-        </p:nvSpPr>
-        <p:spPr>
-          <a:xfrm>
-            <a:off x="5240965" y="2289459"/>
-            <a:ext cx="1521570" cy="400110"/>
-          </a:xfrm>
-          <a:prstGeom prst="rect">
-            <a:avLst/>
-          </a:prstGeom>
-          <a:noFill/>
-        </p:spPr>
-        <p:txBody>
-          <a:bodyPr wrap="none" rtlCol="0">
-            <a:spAutoFit/>
-          </a:bodyPr>
-          <a:lstStyle/>
-          <a:p>
-            <a:pPr algn="ctr"/>
-            <a:r>
-              <a:rPr kumimoji="1" lang="en-US" altLang="ja-JP" sz="1000" dirty="0" smtClean="0">
-                <a:solidFill>
-                  <a:srgbClr val="FF0000"/>
-                </a:solidFill>
-              </a:rPr>
-              <a:t>Target of </a:t>
-            </a:r>
-          </a:p>
-          <a:p>
-            <a:pPr algn="ctr"/>
-            <a:r>
-              <a:rPr kumimoji="1" lang="en-US" altLang="ja-JP" sz="1000" dirty="0" smtClean="0">
-                <a:solidFill>
-                  <a:srgbClr val="FF0000"/>
-                </a:solidFill>
-              </a:rPr>
-              <a:t>Transaction Management</a:t>
-            </a:r>
-            <a:endParaRPr kumimoji="1" lang="ja-JP" altLang="en-US" sz="1000" dirty="0">
-              <a:solidFill>
-                <a:srgbClr val="FF0000"/>
-              </a:solidFill>
-            </a:endParaRPr>
+            <a:endParaRPr kumimoji="1" lang="ja-JP" altLang="en-US" sz="1300" dirty="0"/>
           </a:p>
         </p:txBody>
       </p:sp>
@@ -15388,7 +15221,7 @@
         </p:nvSpPr>
         <p:spPr>
           <a:xfrm>
-            <a:off x="2027672" y="1810267"/>
+            <a:off x="2040723" y="1284645"/>
             <a:ext cx="385042" cy="307777"/>
           </a:xfrm>
           <a:prstGeom prst="rect">
@@ -15418,7 +15251,7 @@
         </p:nvSpPr>
         <p:spPr>
           <a:xfrm>
-            <a:off x="3866318" y="1787674"/>
+            <a:off x="5469431" y="2000087"/>
             <a:ext cx="385042" cy="307777"/>
           </a:xfrm>
           <a:prstGeom prst="rect">
@@ -15448,7 +15281,7 @@
         </p:nvSpPr>
         <p:spPr>
           <a:xfrm>
-            <a:off x="2027672" y="2299709"/>
+            <a:off x="2035540" y="3502952"/>
             <a:ext cx="385042" cy="307777"/>
           </a:xfrm>
           <a:prstGeom prst="rect">
@@ -15478,7 +15311,7 @@
         </p:nvSpPr>
         <p:spPr>
           <a:xfrm>
-            <a:off x="3866318" y="2304764"/>
+            <a:off x="2474227" y="3119445"/>
             <a:ext cx="385042" cy="307777"/>
           </a:xfrm>
           <a:prstGeom prst="rect">
@@ -15508,7 +15341,7 @@
         </p:nvSpPr>
         <p:spPr>
           <a:xfrm>
-            <a:off x="5319922" y="1956225"/>
+            <a:off x="5476828" y="2896094"/>
             <a:ext cx="385042" cy="307777"/>
           </a:xfrm>
           <a:prstGeom prst="rect">
@@ -15530,6 +15363,210 @@
           </a:p>
         </p:txBody>
       </p:sp>
+      <p:sp>
+        <p:nvSpPr>
+          <p:cNvPr id="23" name="角丸四角形 22"/>
+          <p:cNvSpPr/>
+          <p:nvPr/>
+        </p:nvSpPr>
+        <p:spPr>
+          <a:xfrm>
+            <a:off x="6152709" y="2117081"/>
+            <a:ext cx="2559887" cy="981720"/>
+          </a:xfrm>
+          <a:prstGeom prst="roundRect">
+            <a:avLst/>
+          </a:prstGeom>
+        </p:spPr>
+        <p:style>
+          <a:lnRef idx="1">
+            <a:schemeClr val="accent1"/>
+          </a:lnRef>
+          <a:fillRef idx="3">
+            <a:schemeClr val="accent1"/>
+          </a:fillRef>
+          <a:effectRef idx="2">
+            <a:schemeClr val="accent1"/>
+          </a:effectRef>
+          <a:fontRef idx="minor">
+            <a:schemeClr val="lt1"/>
+          </a:fontRef>
+        </p:style>
+        <p:txBody>
+          <a:bodyPr rtlCol="0" anchor="t"/>
+          <a:lstStyle/>
+          <a:p>
+            <a:pPr algn="ctr"/>
+            <a:r>
+              <a:rPr lang="en-US" altLang="ja-JP" b="1" dirty="0" err="1" smtClean="0">
+                <a:solidFill>
+                  <a:schemeClr val="bg1"/>
+                </a:solidFill>
+                <a:effectLst>
+                  <a:outerShdw blurRad="50800" dist="38100" dir="2700000" algn="tl" rotWithShape="0">
+                    <a:prstClr val="black">
+                      <a:alpha val="40000"/>
+                    </a:prstClr>
+                  </a:outerShdw>
+                </a:effectLst>
+              </a:rPr>
+              <a:t>TodoService</a:t>
+            </a:r>
+            <a:endParaRPr lang="en-US" altLang="ja-JP" sz="1050" dirty="0"/>
+          </a:p>
+        </p:txBody>
+      </p:sp>
+      <p:sp>
+        <p:nvSpPr>
+          <p:cNvPr id="7" name="正方形/長方形 6"/>
+          <p:cNvSpPr/>
+          <p:nvPr/>
+        </p:nvSpPr>
+        <p:spPr>
+          <a:xfrm>
+            <a:off x="1918742" y="1622568"/>
+            <a:ext cx="7429694" cy="1917709"/>
+          </a:xfrm>
+          <a:prstGeom prst="rect">
+            <a:avLst/>
+          </a:prstGeom>
+          <a:noFill/>
+          <a:ln w="34925">
+            <a:prstDash val="dash"/>
+          </a:ln>
+        </p:spPr>
+        <p:style>
+          <a:lnRef idx="2">
+            <a:schemeClr val="accent4"/>
+          </a:lnRef>
+          <a:fillRef idx="1">
+            <a:schemeClr val="lt1"/>
+          </a:fillRef>
+          <a:effectRef idx="0">
+            <a:schemeClr val="accent4"/>
+          </a:effectRef>
+          <a:fontRef idx="minor">
+            <a:schemeClr val="dk1"/>
+          </a:fontRef>
+        </p:style>
+        <p:txBody>
+          <a:bodyPr rtlCol="0" anchor="ctr"/>
+          <a:lstStyle/>
+          <a:p>
+            <a:pPr algn="ctr"/>
+            <a:endParaRPr kumimoji="1" lang="ja-JP" altLang="en-US"/>
+          </a:p>
+        </p:txBody>
+      </p:sp>
+      <p:sp>
+        <p:nvSpPr>
+          <p:cNvPr id="28" name="正方形/長方形 27"/>
+          <p:cNvSpPr/>
+          <p:nvPr/>
+        </p:nvSpPr>
+        <p:spPr>
+          <a:xfrm>
+            <a:off x="5875461" y="1879600"/>
+            <a:ext cx="3154239" cy="1440313"/>
+          </a:xfrm>
+          <a:prstGeom prst="rect">
+            <a:avLst/>
+          </a:prstGeom>
+          <a:noFill/>
+          <a:ln w="34925">
+            <a:prstDash val="dash"/>
+          </a:ln>
+        </p:spPr>
+        <p:style>
+          <a:lnRef idx="2">
+            <a:schemeClr val="accent1"/>
+          </a:lnRef>
+          <a:fillRef idx="1">
+            <a:schemeClr val="lt1"/>
+          </a:fillRef>
+          <a:effectRef idx="0">
+            <a:schemeClr val="accent1"/>
+          </a:effectRef>
+          <a:fontRef idx="minor">
+            <a:schemeClr val="dk1"/>
+          </a:fontRef>
+        </p:style>
+        <p:txBody>
+          <a:bodyPr rtlCol="0" anchor="ctr"/>
+          <a:lstStyle/>
+          <a:p>
+            <a:pPr algn="ctr"/>
+            <a:endParaRPr kumimoji="1" lang="ja-JP" altLang="en-US"/>
+          </a:p>
+        </p:txBody>
+      </p:sp>
+      <p:cxnSp>
+        <p:nvCxnSpPr>
+          <p:cNvPr id="31" name="直線矢印コネクタ 30"/>
+          <p:cNvCxnSpPr/>
+          <p:nvPr/>
+        </p:nvCxnSpPr>
+        <p:spPr>
+          <a:xfrm flipV="1">
+            <a:off x="5465638" y="2307864"/>
+            <a:ext cx="687071" cy="3427"/>
+          </a:xfrm>
+          <a:prstGeom prst="straightConnector1">
+            <a:avLst/>
+          </a:prstGeom>
+          <a:ln>
+            <a:tailEnd type="arrow"/>
+          </a:ln>
+        </p:spPr>
+        <p:style>
+          <a:lnRef idx="2">
+            <a:schemeClr val="accent1"/>
+          </a:lnRef>
+          <a:fillRef idx="0">
+            <a:schemeClr val="accent1"/>
+          </a:fillRef>
+          <a:effectRef idx="1">
+            <a:schemeClr val="accent1"/>
+          </a:effectRef>
+          <a:fontRef idx="minor">
+            <a:schemeClr val="tx1"/>
+          </a:fontRef>
+        </p:style>
+      </p:cxnSp>
+      <p:cxnSp>
+        <p:nvCxnSpPr>
+          <p:cNvPr id="32" name="直線矢印コネクタ 31"/>
+          <p:cNvCxnSpPr/>
+          <p:nvPr/>
+        </p:nvCxnSpPr>
+        <p:spPr>
+          <a:xfrm>
+            <a:off x="5450225" y="2880665"/>
+            <a:ext cx="702484" cy="0"/>
+          </a:xfrm>
+          <a:prstGeom prst="straightConnector1">
+            <a:avLst/>
+          </a:prstGeom>
+          <a:ln>
+            <a:headEnd type="arrow"/>
+            <a:tailEnd type="none"/>
+          </a:ln>
+        </p:spPr>
+        <p:style>
+          <a:lnRef idx="2">
+            <a:schemeClr val="accent1"/>
+          </a:lnRef>
+          <a:fillRef idx="0">
+            <a:schemeClr val="accent1"/>
+          </a:fillRef>
+          <a:effectRef idx="1">
+            <a:schemeClr val="accent1"/>
+          </a:effectRef>
+          <a:fontRef idx="minor">
+            <a:schemeClr val="tx1"/>
+          </a:fontRef>
+        </p:style>
+      </p:cxnSp>
     </p:spTree>
     <p:extLst>
       <p:ext uri="{BB962C8B-B14F-4D97-AF65-F5344CB8AC3E}">
@@ -15569,18 +15606,21 @@
       </p:grpSpPr>
       <p:sp>
         <p:nvSpPr>
-          <p:cNvPr id="25" name="角丸四角形 24"/>
+          <p:cNvPr id="37" name="角丸四角形 36"/>
           <p:cNvSpPr/>
           <p:nvPr/>
         </p:nvSpPr>
         <p:spPr>
           <a:xfrm>
-            <a:off x="4343016" y="1107830"/>
-            <a:ext cx="2614832" cy="2065637"/>
+            <a:off x="-161365" y="951345"/>
+            <a:ext cx="2206576" cy="3028968"/>
           </a:xfrm>
           <a:prstGeom prst="roundRect">
             <a:avLst/>
           </a:prstGeom>
+          <a:solidFill>
+            <a:srgbClr val="92D050"/>
+          </a:solidFill>
         </p:spPr>
         <p:style>
           <a:lnRef idx="1">
@@ -15602,21 +15642,18 @@
           <a:p>
             <a:pPr algn="ctr"/>
             <a:r>
-              <a:rPr lang="en-US" altLang="ja-JP" sz="2000" b="1" dirty="0">
-                <a:solidFill>
-                  <a:schemeClr val="bg1"/>
-                </a:solidFill>
+              <a:rPr lang="en-US" altLang="ja-JP" dirty="0" err="1" smtClean="0">
                 <a:effectLst>
-                  <a:outerShdw blurRad="50800" dist="38100" dir="2700000" algn="tl" rotWithShape="0">
-                    <a:prstClr val="black">
-                      <a:alpha val="40000"/>
-                    </a:prstClr>
+                  <a:outerShdw blurRad="38100" dist="38100" dir="2700000" algn="tl">
+                    <a:srgbClr val="000000">
+                      <a:alpha val="43137"/>
+                    </a:srgbClr>
                   </a:outerShdw>
                 </a:effectLst>
               </a:rPr>
-              <a:t>MessageListener</a:t>
-            </a:r>
-            <a:endParaRPr kumimoji="1" lang="en-US" altLang="ja-JP" sz="2000" b="1" dirty="0" smtClean="0">
+              <a:t>DefaultMessage</a:t>
+            </a:r>
+            <a:endParaRPr lang="en-US" altLang="ja-JP" dirty="0" smtClean="0">
               <a:effectLst>
                 <a:outerShdw blurRad="38100" dist="38100" dir="2700000" algn="tl">
                   <a:srgbClr val="000000">
@@ -15628,39 +15665,196 @@
           </a:p>
           <a:p>
             <a:pPr algn="ctr"/>
-            <a:endParaRPr lang="en-US" altLang="ja-JP" sz="1600" dirty="0"/>
-          </a:p>
-          <a:p>
-            <a:pPr algn="ctr"/>
-            <a:endParaRPr lang="en-US" altLang="ja-JP" sz="1100" dirty="0" smtClean="0"/>
+            <a:r>
+              <a:rPr lang="en-US" altLang="ja-JP" dirty="0" err="1" smtClean="0">
+                <a:effectLst>
+                  <a:outerShdw blurRad="38100" dist="38100" dir="2700000" algn="tl">
+                    <a:srgbClr val="000000">
+                      <a:alpha val="43137"/>
+                    </a:srgbClr>
+                  </a:outerShdw>
+                </a:effectLst>
+              </a:rPr>
+              <a:t>ListenerContainer</a:t>
+            </a:r>
+            <a:endParaRPr lang="ja-JP" altLang="en-US" dirty="0">
+              <a:effectLst>
+                <a:outerShdw blurRad="38100" dist="38100" dir="2700000" algn="tl">
+                  <a:srgbClr val="000000">
+                    <a:alpha val="43137"/>
+                  </a:srgbClr>
+                </a:outerShdw>
+              </a:effectLst>
+            </a:endParaRPr>
           </a:p>
         </p:txBody>
       </p:sp>
       <p:sp>
         <p:nvSpPr>
-          <p:cNvPr id="60" name="正方形/長方形 59"/>
+          <p:cNvPr id="57" name="テキスト ボックス 56"/>
+          <p:cNvSpPr txBox="1"/>
+          <p:nvPr/>
+        </p:nvSpPr>
+        <p:spPr>
+          <a:xfrm>
+            <a:off x="5835605" y="1819016"/>
+            <a:ext cx="2604590" cy="338554"/>
+          </a:xfrm>
+          <a:prstGeom prst="rect">
+            <a:avLst/>
+          </a:prstGeom>
+          <a:noFill/>
+          <a:ln>
+            <a:noFill/>
+          </a:ln>
+        </p:spPr>
+        <p:txBody>
+          <a:bodyPr vert="horz" wrap="square" rtlCol="0">
+            <a:spAutoFit/>
+          </a:bodyPr>
+          <a:lstStyle/>
+          <a:p>
+            <a:r>
+              <a:rPr kumimoji="1" lang="en-US" altLang="ja-JP" sz="1600" dirty="0" smtClean="0">
+                <a:solidFill>
+                  <a:schemeClr val="accent1"/>
+                </a:solidFill>
+              </a:rPr>
+              <a:t>DB</a:t>
+            </a:r>
+            <a:r>
+              <a:rPr lang="ja-JP" altLang="en-US" sz="1600" dirty="0">
+                <a:solidFill>
+                  <a:schemeClr val="accent1"/>
+                </a:solidFill>
+              </a:rPr>
+              <a:t> </a:t>
+            </a:r>
+            <a:r>
+              <a:rPr lang="en-US" altLang="ja-JP" sz="1600" dirty="0" smtClean="0">
+                <a:solidFill>
+                  <a:schemeClr val="accent1"/>
+                </a:solidFill>
+              </a:rPr>
+              <a:t>Transaction</a:t>
+            </a:r>
+            <a:r>
+              <a:rPr lang="ja-JP" altLang="en-US" sz="1600" dirty="0" smtClean="0">
+                <a:solidFill>
+                  <a:schemeClr val="accent1"/>
+                </a:solidFill>
+              </a:rPr>
+              <a:t> </a:t>
+            </a:r>
+            <a:r>
+              <a:rPr lang="en-US" altLang="ja-JP" sz="1600" dirty="0" smtClean="0">
+                <a:solidFill>
+                  <a:schemeClr val="accent1"/>
+                </a:solidFill>
+              </a:rPr>
+              <a:t>Boundary</a:t>
+            </a:r>
+            <a:endParaRPr lang="ja-JP" altLang="en-US" sz="1600" dirty="0">
+              <a:solidFill>
+                <a:schemeClr val="accent1"/>
+              </a:solidFill>
+            </a:endParaRPr>
+          </a:p>
+        </p:txBody>
+      </p:sp>
+      <p:sp>
+        <p:nvSpPr>
+          <p:cNvPr id="58" name="テキスト ボックス 57"/>
+          <p:cNvSpPr txBox="1"/>
+          <p:nvPr/>
+        </p:nvSpPr>
+        <p:spPr>
+          <a:xfrm>
+            <a:off x="5809173" y="1261054"/>
+            <a:ext cx="2623715" cy="338554"/>
+          </a:xfrm>
+          <a:prstGeom prst="rect">
+            <a:avLst/>
+          </a:prstGeom>
+          <a:noFill/>
+          <a:ln>
+            <a:noFill/>
+          </a:ln>
+        </p:spPr>
+        <p:txBody>
+          <a:bodyPr vert="horz" wrap="square" rtlCol="0">
+            <a:spAutoFit/>
+          </a:bodyPr>
+          <a:lstStyle/>
+          <a:p>
+            <a:r>
+              <a:rPr lang="en-US" altLang="ja-JP" sz="1600" dirty="0" smtClean="0">
+                <a:solidFill>
+                  <a:srgbClr val="7030A0"/>
+                </a:solidFill>
+              </a:rPr>
+              <a:t>JMS</a:t>
+            </a:r>
+            <a:r>
+              <a:rPr kumimoji="1" lang="ja-JP" altLang="en-US" sz="1600" dirty="0" smtClean="0">
+                <a:solidFill>
+                  <a:srgbClr val="7030A0"/>
+                </a:solidFill>
+              </a:rPr>
+              <a:t> </a:t>
+            </a:r>
+            <a:r>
+              <a:rPr kumimoji="1" lang="en-US" altLang="ja-JP" sz="1600" dirty="0" smtClean="0">
+                <a:solidFill>
+                  <a:srgbClr val="7030A0"/>
+                </a:solidFill>
+              </a:rPr>
+              <a:t>Transaction</a:t>
+            </a:r>
+            <a:r>
+              <a:rPr kumimoji="1" lang="ja-JP" altLang="en-US" sz="1600" dirty="0" smtClean="0">
+                <a:solidFill>
+                  <a:srgbClr val="7030A0"/>
+                </a:solidFill>
+              </a:rPr>
+              <a:t> </a:t>
+            </a:r>
+            <a:r>
+              <a:rPr lang="en-US" altLang="ja-JP" sz="1600" dirty="0" smtClean="0">
+                <a:solidFill>
+                  <a:srgbClr val="7030A0"/>
+                </a:solidFill>
+              </a:rPr>
+              <a:t>Boundary</a:t>
+            </a:r>
+            <a:endParaRPr kumimoji="1" lang="ja-JP" altLang="en-US" sz="1600" dirty="0">
+              <a:solidFill>
+                <a:srgbClr val="7030A0"/>
+              </a:solidFill>
+            </a:endParaRPr>
+          </a:p>
+        </p:txBody>
+      </p:sp>
+      <p:sp>
+        <p:nvSpPr>
+          <p:cNvPr id="40" name="角丸四角形 39"/>
           <p:cNvSpPr/>
           <p:nvPr/>
         </p:nvSpPr>
         <p:spPr>
           <a:xfrm>
-            <a:off x="2307690" y="1832860"/>
-            <a:ext cx="4504590" cy="895809"/>
+            <a:off x="2835393" y="951345"/>
+            <a:ext cx="2614832" cy="3028968"/>
           </a:xfrm>
-          <a:prstGeom prst="rect">
+          <a:prstGeom prst="roundRect">
             <a:avLst/>
           </a:prstGeom>
           <a:solidFill>
-            <a:schemeClr val="accent2">
-              <a:lumMod val="75000"/>
-              <a:alpha val="17000"/>
+            <a:schemeClr val="accent4">
+              <a:lumMod val="60000"/>
+              <a:lumOff val="40000"/>
             </a:schemeClr>
           </a:solidFill>
-          <a:ln>
-            <a:solidFill>
-              <a:schemeClr val="tx1"/>
-            </a:solidFill>
-          </a:ln>
         </p:spPr>
         <p:style>
           <a:lnRef idx="1">
@@ -15677,11 +15871,26 @@
           </a:fontRef>
         </p:style>
         <p:txBody>
-          <a:bodyPr rtlCol="0" anchor="ctr"/>
+          <a:bodyPr rtlCol="0" anchor="t"/>
           <a:lstStyle/>
           <a:p>
             <a:pPr algn="ctr"/>
-            <a:endParaRPr kumimoji="1" lang="ja-JP" altLang="en-US" dirty="0"/>
+            <a:r>
+              <a:rPr lang="en-US" altLang="ja-JP" b="1" dirty="0" err="1" smtClean="0">
+                <a:solidFill>
+                  <a:schemeClr val="bg1"/>
+                </a:solidFill>
+                <a:effectLst>
+                  <a:outerShdw blurRad="50800" dist="38100" dir="2700000" algn="tl" rotWithShape="0">
+                    <a:prstClr val="black">
+                      <a:alpha val="40000"/>
+                    </a:prstClr>
+                  </a:outerShdw>
+                </a:effectLst>
+              </a:rPr>
+              <a:t>MessageListener</a:t>
+            </a:r>
+            <a:endParaRPr lang="en-US" altLang="ja-JP" sz="1050" dirty="0"/>
           </a:p>
         </p:txBody>
       </p:sp>
@@ -15692,142 +15901,18 @@
           <p:nvPr/>
         </p:nvCxnSpPr>
         <p:spPr>
-          <a:xfrm flipV="1">
-            <a:off x="2040157" y="2064673"/>
-            <a:ext cx="2290431" cy="18617"/>
+          <a:xfrm>
+            <a:off x="2046722" y="1725669"/>
+            <a:ext cx="788671" cy="2255"/>
           </a:xfrm>
           <a:prstGeom prst="straightConnector1">
             <a:avLst/>
           </a:prstGeom>
           <a:ln>
+            <a:solidFill>
+              <a:schemeClr val="accent4"/>
+            </a:solidFill>
             <a:tailEnd type="arrow"/>
-          </a:ln>
-        </p:spPr>
-        <p:style>
-          <a:lnRef idx="2">
-            <a:schemeClr val="accent1"/>
-          </a:lnRef>
-          <a:fillRef idx="0">
-            <a:schemeClr val="accent1"/>
-          </a:fillRef>
-          <a:effectRef idx="1">
-            <a:schemeClr val="accent1"/>
-          </a:effectRef>
-          <a:fontRef idx="minor">
-            <a:schemeClr val="tx1"/>
-          </a:fontRef>
-        </p:style>
-      </p:cxnSp>
-      <p:sp>
-        <p:nvSpPr>
-          <p:cNvPr id="51" name="正方形/長方形 50"/>
-          <p:cNvSpPr/>
-          <p:nvPr/>
-        </p:nvSpPr>
-        <p:spPr>
-          <a:xfrm>
-            <a:off x="4165600" y="1882091"/>
-            <a:ext cx="2578099" cy="797236"/>
-          </a:xfrm>
-          <a:prstGeom prst="rect">
-            <a:avLst/>
-          </a:prstGeom>
-          <a:solidFill>
-            <a:schemeClr val="accent1">
-              <a:alpha val="11000"/>
-            </a:schemeClr>
-          </a:solidFill>
-          <a:ln>
-            <a:solidFill>
-              <a:schemeClr val="tx1"/>
-            </a:solidFill>
-          </a:ln>
-        </p:spPr>
-        <p:style>
-          <a:lnRef idx="1">
-            <a:schemeClr val="accent1"/>
-          </a:lnRef>
-          <a:fillRef idx="3">
-            <a:schemeClr val="accent1"/>
-          </a:fillRef>
-          <a:effectRef idx="2">
-            <a:schemeClr val="accent1"/>
-          </a:effectRef>
-          <a:fontRef idx="minor">
-            <a:schemeClr val="lt1"/>
-          </a:fontRef>
-        </p:style>
-        <p:txBody>
-          <a:bodyPr rtlCol="0" anchor="ctr"/>
-          <a:lstStyle/>
-          <a:p>
-            <a:pPr algn="ctr"/>
-            <a:endParaRPr kumimoji="1" lang="ja-JP" altLang="en-US" dirty="0"/>
-          </a:p>
-        </p:txBody>
-      </p:sp>
-      <p:cxnSp>
-        <p:nvCxnSpPr>
-          <p:cNvPr id="29" name="直線矢印コネクタ 28"/>
-          <p:cNvCxnSpPr/>
-          <p:nvPr/>
-        </p:nvCxnSpPr>
-        <p:spPr>
-          <a:xfrm>
-            <a:off x="4153088" y="1450768"/>
-            <a:ext cx="9269" cy="1395571"/>
-          </a:xfrm>
-          <a:prstGeom prst="straightConnector1">
-            <a:avLst/>
-          </a:prstGeom>
-          <a:ln w="31750">
-            <a:solidFill>
-              <a:schemeClr val="tx2">
-                <a:lumMod val="60000"/>
-                <a:lumOff val="40000"/>
-              </a:schemeClr>
-            </a:solidFill>
-            <a:prstDash val="dash"/>
-            <a:headEnd type="none"/>
-            <a:tailEnd type="none"/>
-          </a:ln>
-        </p:spPr>
-        <p:style>
-          <a:lnRef idx="2">
-            <a:schemeClr val="accent1"/>
-          </a:lnRef>
-          <a:fillRef idx="0">
-            <a:schemeClr val="accent1"/>
-          </a:fillRef>
-          <a:effectRef idx="1">
-            <a:schemeClr val="accent1"/>
-          </a:effectRef>
-          <a:fontRef idx="minor">
-            <a:schemeClr val="tx1"/>
-          </a:fontRef>
-        </p:style>
-      </p:cxnSp>
-      <p:cxnSp>
-        <p:nvCxnSpPr>
-          <p:cNvPr id="43" name="直線矢印コネクタ 42"/>
-          <p:cNvCxnSpPr/>
-          <p:nvPr/>
-        </p:nvCxnSpPr>
-        <p:spPr>
-          <a:xfrm>
-            <a:off x="2302730" y="1462136"/>
-            <a:ext cx="0" cy="1459163"/>
-          </a:xfrm>
-          <a:prstGeom prst="straightConnector1">
-            <a:avLst/>
-          </a:prstGeom>
-          <a:ln w="31750">
-            <a:solidFill>
-              <a:srgbClr val="7030A0"/>
-            </a:solidFill>
-            <a:prstDash val="dash"/>
-            <a:headEnd type="none"/>
-            <a:tailEnd type="none" w="sm" len="sm"/>
           </a:ln>
         </p:spPr>
         <p:style>
@@ -15853,7 +15938,7 @@
         </p:nvSpPr>
         <p:spPr>
           <a:xfrm>
-            <a:off x="4441923" y="2635559"/>
+            <a:off x="5896901" y="3738661"/>
             <a:ext cx="1284243" cy="410117"/>
           </a:xfrm>
           <a:prstGeom prst="borderCallout2">
@@ -15862,8 +15947,8 @@
               <a:gd name="adj2" fmla="val 567"/>
               <a:gd name="adj3" fmla="val 18750"/>
               <a:gd name="adj4" fmla="val -16667"/>
-              <a:gd name="adj5" fmla="val -11992"/>
-              <a:gd name="adj6" fmla="val -22796"/>
+              <a:gd name="adj5" fmla="val -123247"/>
+              <a:gd name="adj6" fmla="val -17132"/>
             </a:avLst>
           </a:prstGeom>
           <a:solidFill>
@@ -15900,7 +15985,7 @@
                   <a:schemeClr val="tx1"/>
                 </a:solidFill>
               </a:rPr>
-              <a:t>Rollback </a:t>
+              <a:t>Rollback</a:t>
             </a:r>
           </a:p>
           <a:p>
@@ -15911,9 +15996,17 @@
                   <a:schemeClr val="tx1"/>
                 </a:solidFill>
               </a:rPr>
-              <a:t>DB Transaction</a:t>
-            </a:r>
-            <a:endParaRPr lang="en-US" altLang="ja-JP" sz="1400" dirty="0">
+              <a:t>DB </a:t>
+            </a:r>
+            <a:r>
+              <a:rPr lang="en-US" altLang="ja-JP" sz="1400" dirty="0">
+                <a:solidFill>
+                  <a:schemeClr val="tx1"/>
+                </a:solidFill>
+              </a:rPr>
+              <a:t>Transaction</a:t>
+            </a:r>
+            <a:endParaRPr lang="ja-JP" altLang="en-US" sz="1400" dirty="0">
               <a:solidFill>
                 <a:schemeClr val="tx1"/>
               </a:solidFill>
@@ -15929,8 +16022,8 @@
         </p:nvSpPr>
         <p:spPr>
           <a:xfrm>
-            <a:off x="2647037" y="2655386"/>
-            <a:ext cx="1411802" cy="410117"/>
+            <a:off x="2446532" y="4164930"/>
+            <a:ext cx="1373883" cy="410117"/>
           </a:xfrm>
           <a:prstGeom prst="borderCallout2">
             <a:avLst>
@@ -15938,8 +16031,8 @@
               <a:gd name="adj2" fmla="val -620"/>
               <a:gd name="adj3" fmla="val 18750"/>
               <a:gd name="adj4" fmla="val -16667"/>
-              <a:gd name="adj5" fmla="val -12611"/>
-              <a:gd name="adj6" fmla="val -23983"/>
+              <a:gd name="adj5" fmla="val -74545"/>
+              <a:gd name="adj6" fmla="val -17512"/>
             </a:avLst>
           </a:prstGeom>
           <a:solidFill>
@@ -15971,28 +16064,39 @@
           <a:p>
             <a:pPr algn="ctr"/>
             <a:r>
-              <a:rPr lang="en-US" altLang="ja-JP" sz="1400" dirty="0">
-                <a:solidFill>
-                  <a:schemeClr val="tx1"/>
-                </a:solidFill>
-              </a:rPr>
-              <a:t>Rollback </a:t>
-            </a:r>
-            <a:endParaRPr lang="en-US" altLang="ja-JP" sz="1400" dirty="0" smtClean="0">
-              <a:solidFill>
-                <a:schemeClr val="tx1"/>
-              </a:solidFill>
-            </a:endParaRPr>
-          </a:p>
-          <a:p>
-            <a:pPr algn="ctr"/>
-            <a:r>
               <a:rPr lang="en-US" altLang="ja-JP" sz="1400" dirty="0" smtClean="0">
                 <a:solidFill>
                   <a:schemeClr val="tx1"/>
                 </a:solidFill>
               </a:rPr>
-              <a:t>JMS Transaction</a:t>
+              <a:t>Rollback</a:t>
+            </a:r>
+          </a:p>
+          <a:p>
+            <a:pPr algn="ctr"/>
+            <a:r>
+              <a:rPr lang="en-US" altLang="ja-JP" sz="1400" dirty="0" smtClean="0">
+                <a:solidFill>
+                  <a:schemeClr val="tx1"/>
+                </a:solidFill>
+              </a:rPr>
+              <a:t>JMS</a:t>
+            </a:r>
+            <a:r>
+              <a:rPr lang="ja-JP" altLang="en-US" sz="1400" dirty="0" smtClean="0">
+                <a:solidFill>
+                  <a:schemeClr val="tx1"/>
+                </a:solidFill>
+              </a:rPr>
+              <a:t> </a:t>
+            </a:r>
+            <a:r>
+              <a:rPr lang="en-US" altLang="ja-JP" sz="1400" dirty="0" smtClean="0">
+                <a:solidFill>
+                  <a:schemeClr val="tx1"/>
+                </a:solidFill>
+              </a:rPr>
+              <a:t>Transaction</a:t>
             </a:r>
             <a:endParaRPr lang="en-US" altLang="ja-JP" sz="1400" dirty="0">
               <a:solidFill>
@@ -16009,15 +16113,17 @@
           <p:nvPr/>
         </p:nvCxnSpPr>
         <p:spPr>
-          <a:xfrm flipV="1">
-            <a:off x="2011525" y="2571527"/>
-            <a:ext cx="2347693" cy="1641"/>
+          <a:xfrm>
+            <a:off x="2046722" y="3419520"/>
+            <a:ext cx="788671" cy="0"/>
           </a:xfrm>
           <a:prstGeom prst="straightConnector1">
             <a:avLst/>
           </a:prstGeom>
           <a:ln>
-            <a:prstDash val="sysDash"/>
+            <a:solidFill>
+              <a:schemeClr val="accent4"/>
+            </a:solidFill>
             <a:headEnd type="arrow"/>
             <a:tailEnd type="none"/>
           </a:ln>
@@ -16045,8 +16151,8 @@
         </p:nvSpPr>
         <p:spPr>
           <a:xfrm>
-            <a:off x="4292916" y="1641157"/>
-            <a:ext cx="2297424" cy="1107996"/>
+            <a:off x="2829289" y="1361474"/>
+            <a:ext cx="2664832" cy="2092881"/>
           </a:xfrm>
           <a:prstGeom prst="rect">
             <a:avLst/>
@@ -16060,60 +16166,422 @@
           <a:lstStyle/>
           <a:p>
             <a:r>
-              <a:rPr lang="en-US" altLang="ja-JP" sz="1100" dirty="0" smtClean="0"/>
+              <a:rPr lang="en-US" altLang="ja-JP" sz="1300" dirty="0" smtClean="0"/>
               <a:t>@JmsListener(…)</a:t>
             </a:r>
           </a:p>
           <a:p>
             <a:r>
-              <a:rPr lang="en-US" altLang="ja-JP" sz="1100" dirty="0" smtClean="0"/>
+              <a:rPr lang="en-US" altLang="ja-JP" sz="1300" dirty="0" smtClean="0"/>
               <a:t>public void receiveTodo(Todo </a:t>
             </a:r>
             <a:r>
-              <a:rPr lang="en-US" altLang="ja-JP" sz="1100" dirty="0"/>
+              <a:rPr lang="en-US" altLang="ja-JP" sz="1300" dirty="0"/>
               <a:t>todo) {</a:t>
             </a:r>
           </a:p>
           <a:p>
-            <a:r>
-              <a:rPr lang="en-US" altLang="ja-JP" sz="1100" dirty="0" smtClean="0"/>
+            <a:endParaRPr lang="en-US" altLang="ja-JP" sz="1300" dirty="0"/>
+          </a:p>
+          <a:p>
+            <a:r>
+              <a:rPr lang="en-US" altLang="ja-JP" sz="1300" dirty="0" smtClean="0"/>
               <a:t>    // omitted</a:t>
             </a:r>
           </a:p>
           <a:p>
             <a:r>
-              <a:rPr lang="en-US" altLang="ja-JP" sz="1100" dirty="0" smtClean="0"/>
+              <a:rPr lang="en-US" altLang="ja-JP" sz="1300" dirty="0" smtClean="0"/>
               <a:t>    todoService.insertTodo(todo)</a:t>
             </a:r>
           </a:p>
           <a:p>
-            <a:r>
-              <a:rPr lang="en-US" altLang="ja-JP" sz="1100" dirty="0" smtClean="0"/>
-              <a:t>    // </a:t>
-            </a:r>
-            <a:r>
-              <a:rPr lang="en-US" altLang="ja-JP" sz="1100" dirty="0"/>
-              <a:t>omitted</a:t>
-            </a:r>
-          </a:p>
-          <a:p>
-            <a:r>
-              <a:rPr lang="en-US" altLang="ja-JP" sz="1100" dirty="0" smtClean="0"/>
+            <a:endParaRPr lang="en-US" altLang="ja-JP" sz="1300" dirty="0" smtClean="0"/>
+          </a:p>
+          <a:p>
+            <a:endParaRPr lang="en-US" altLang="ja-JP" sz="1300" dirty="0" smtClean="0"/>
+          </a:p>
+          <a:p>
+            <a:r>
+              <a:rPr lang="en-US" altLang="ja-JP" sz="1300" dirty="0" smtClean="0"/>
+              <a:t>    // omitted</a:t>
+            </a:r>
+          </a:p>
+          <a:p>
+            <a:endParaRPr lang="en-US" altLang="ja-JP" sz="1300" dirty="0"/>
+          </a:p>
+          <a:p>
+            <a:r>
+              <a:rPr lang="en-US" altLang="ja-JP" sz="1300" dirty="0" smtClean="0"/>
               <a:t>}</a:t>
             </a:r>
-            <a:endParaRPr kumimoji="1" lang="ja-JP" altLang="en-US" sz="1100" dirty="0"/>
+            <a:endParaRPr kumimoji="1" lang="ja-JP" altLang="en-US" sz="1300" dirty="0"/>
           </a:p>
         </p:txBody>
       </p:sp>
+      <p:sp>
+        <p:nvSpPr>
+          <p:cNvPr id="5" name="テキスト ボックス 4"/>
+          <p:cNvSpPr txBox="1"/>
+          <p:nvPr/>
+        </p:nvSpPr>
+        <p:spPr>
+          <a:xfrm>
+            <a:off x="2040723" y="1284645"/>
+            <a:ext cx="385042" cy="307777"/>
+          </a:xfrm>
+          <a:prstGeom prst="rect">
+            <a:avLst/>
+          </a:prstGeom>
+          <a:noFill/>
+        </p:spPr>
+        <p:txBody>
+          <a:bodyPr wrap="none" rtlCol="0">
+            <a:spAutoFit/>
+          </a:bodyPr>
+          <a:lstStyle/>
+          <a:p>
+            <a:r>
+              <a:rPr kumimoji="1" lang="en-US" altLang="ja-JP" sz="1400" dirty="0" smtClean="0"/>
+              <a:t>(1)</a:t>
+            </a:r>
+            <a:endParaRPr kumimoji="1" lang="ja-JP" altLang="en-US" sz="1400" dirty="0"/>
+          </a:p>
+        </p:txBody>
+      </p:sp>
+      <p:sp>
+        <p:nvSpPr>
+          <p:cNvPr id="24" name="テキスト ボックス 23"/>
+          <p:cNvSpPr txBox="1"/>
+          <p:nvPr/>
+        </p:nvSpPr>
+        <p:spPr>
+          <a:xfrm>
+            <a:off x="5469431" y="2000087"/>
+            <a:ext cx="385042" cy="307777"/>
+          </a:xfrm>
+          <a:prstGeom prst="rect">
+            <a:avLst/>
+          </a:prstGeom>
+          <a:noFill/>
+        </p:spPr>
+        <p:txBody>
+          <a:bodyPr wrap="none" rtlCol="0">
+            <a:spAutoFit/>
+          </a:bodyPr>
+          <a:lstStyle/>
+          <a:p>
+            <a:r>
+              <a:rPr kumimoji="1" lang="en-US" altLang="ja-JP" sz="1400" dirty="0" smtClean="0"/>
+              <a:t>(2)</a:t>
+            </a:r>
+            <a:endParaRPr kumimoji="1" lang="ja-JP" altLang="en-US" sz="1400" dirty="0"/>
+          </a:p>
+        </p:txBody>
+      </p:sp>
+      <p:sp>
+        <p:nvSpPr>
+          <p:cNvPr id="33" name="テキスト ボックス 32"/>
+          <p:cNvSpPr txBox="1"/>
+          <p:nvPr/>
+        </p:nvSpPr>
+        <p:spPr>
+          <a:xfrm>
+            <a:off x="2035540" y="3502952"/>
+            <a:ext cx="385042" cy="307777"/>
+          </a:xfrm>
+          <a:prstGeom prst="rect">
+            <a:avLst/>
+          </a:prstGeom>
+          <a:noFill/>
+        </p:spPr>
+        <p:txBody>
+          <a:bodyPr wrap="none" rtlCol="0">
+            <a:spAutoFit/>
+          </a:bodyPr>
+          <a:lstStyle/>
+          <a:p>
+            <a:r>
+              <a:rPr kumimoji="1" lang="en-US" altLang="ja-JP" sz="1400" dirty="0" smtClean="0"/>
+              <a:t>(5)</a:t>
+            </a:r>
+            <a:endParaRPr kumimoji="1" lang="ja-JP" altLang="en-US" sz="1400" dirty="0"/>
+          </a:p>
+        </p:txBody>
+      </p:sp>
+      <p:sp>
+        <p:nvSpPr>
+          <p:cNvPr id="20" name="テキスト ボックス 19"/>
+          <p:cNvSpPr txBox="1"/>
+          <p:nvPr/>
+        </p:nvSpPr>
+        <p:spPr>
+          <a:xfrm>
+            <a:off x="5488727" y="2952077"/>
+            <a:ext cx="385042" cy="307777"/>
+          </a:xfrm>
+          <a:prstGeom prst="rect">
+            <a:avLst/>
+          </a:prstGeom>
+          <a:noFill/>
+        </p:spPr>
+        <p:txBody>
+          <a:bodyPr wrap="none" rtlCol="0">
+            <a:spAutoFit/>
+          </a:bodyPr>
+          <a:lstStyle/>
+          <a:p>
+            <a:r>
+              <a:rPr kumimoji="1" lang="en-US" altLang="ja-JP" sz="1400" dirty="0" smtClean="0"/>
+              <a:t>(4)</a:t>
+            </a:r>
+            <a:endParaRPr kumimoji="1" lang="ja-JP" altLang="en-US" sz="1400" dirty="0"/>
+          </a:p>
+        </p:txBody>
+      </p:sp>
+      <p:sp>
+        <p:nvSpPr>
+          <p:cNvPr id="22" name="テキスト ボックス 21"/>
+          <p:cNvSpPr txBox="1"/>
+          <p:nvPr/>
+        </p:nvSpPr>
+        <p:spPr>
+          <a:xfrm>
+            <a:off x="7890875" y="2767711"/>
+            <a:ext cx="385042" cy="307777"/>
+          </a:xfrm>
+          <a:prstGeom prst="rect">
+            <a:avLst/>
+          </a:prstGeom>
+          <a:noFill/>
+        </p:spPr>
+        <p:txBody>
+          <a:bodyPr wrap="none" rtlCol="0">
+            <a:spAutoFit/>
+          </a:bodyPr>
+          <a:lstStyle/>
+          <a:p>
+            <a:r>
+              <a:rPr kumimoji="1" lang="en-US" altLang="ja-JP" sz="1400" dirty="0" smtClean="0"/>
+              <a:t>(3)</a:t>
+            </a:r>
+            <a:endParaRPr kumimoji="1" lang="ja-JP" altLang="en-US" sz="1400" dirty="0"/>
+          </a:p>
+        </p:txBody>
+      </p:sp>
+      <p:sp>
+        <p:nvSpPr>
+          <p:cNvPr id="23" name="角丸四角形 22"/>
+          <p:cNvSpPr/>
+          <p:nvPr/>
+        </p:nvSpPr>
+        <p:spPr>
+          <a:xfrm>
+            <a:off x="6152709" y="2117081"/>
+            <a:ext cx="2559887" cy="981720"/>
+          </a:xfrm>
+          <a:prstGeom prst="roundRect">
+            <a:avLst/>
+          </a:prstGeom>
+        </p:spPr>
+        <p:style>
+          <a:lnRef idx="1">
+            <a:schemeClr val="accent1"/>
+          </a:lnRef>
+          <a:fillRef idx="3">
+            <a:schemeClr val="accent1"/>
+          </a:fillRef>
+          <a:effectRef idx="2">
+            <a:schemeClr val="accent1"/>
+          </a:effectRef>
+          <a:fontRef idx="minor">
+            <a:schemeClr val="lt1"/>
+          </a:fontRef>
+        </p:style>
+        <p:txBody>
+          <a:bodyPr rtlCol="0" anchor="t"/>
+          <a:lstStyle/>
+          <a:p>
+            <a:pPr algn="ctr"/>
+            <a:r>
+              <a:rPr lang="en-US" altLang="ja-JP" b="1" dirty="0" err="1" smtClean="0">
+                <a:solidFill>
+                  <a:schemeClr val="bg1"/>
+                </a:solidFill>
+                <a:effectLst>
+                  <a:outerShdw blurRad="50800" dist="38100" dir="2700000" algn="tl" rotWithShape="0">
+                    <a:prstClr val="black">
+                      <a:alpha val="40000"/>
+                    </a:prstClr>
+                  </a:outerShdw>
+                </a:effectLst>
+              </a:rPr>
+              <a:t>TodoService</a:t>
+            </a:r>
+            <a:endParaRPr lang="en-US" altLang="ja-JP" sz="1050" dirty="0"/>
+          </a:p>
+        </p:txBody>
+      </p:sp>
+      <p:sp>
+        <p:nvSpPr>
+          <p:cNvPr id="7" name="正方形/長方形 6"/>
+          <p:cNvSpPr/>
+          <p:nvPr/>
+        </p:nvSpPr>
+        <p:spPr>
+          <a:xfrm>
+            <a:off x="1903752" y="1622568"/>
+            <a:ext cx="7444684" cy="1917709"/>
+          </a:xfrm>
+          <a:prstGeom prst="rect">
+            <a:avLst/>
+          </a:prstGeom>
+          <a:noFill/>
+          <a:ln w="34925">
+            <a:prstDash val="dash"/>
+          </a:ln>
+        </p:spPr>
+        <p:style>
+          <a:lnRef idx="2">
+            <a:schemeClr val="accent4"/>
+          </a:lnRef>
+          <a:fillRef idx="1">
+            <a:schemeClr val="lt1"/>
+          </a:fillRef>
+          <a:effectRef idx="0">
+            <a:schemeClr val="accent4"/>
+          </a:effectRef>
+          <a:fontRef idx="minor">
+            <a:schemeClr val="dk1"/>
+          </a:fontRef>
+        </p:style>
+        <p:txBody>
+          <a:bodyPr rtlCol="0" anchor="ctr"/>
+          <a:lstStyle/>
+          <a:p>
+            <a:pPr algn="ctr"/>
+            <a:endParaRPr kumimoji="1" lang="ja-JP" altLang="en-US"/>
+          </a:p>
+        </p:txBody>
+      </p:sp>
+      <p:sp>
+        <p:nvSpPr>
+          <p:cNvPr id="28" name="正方形/長方形 27"/>
+          <p:cNvSpPr/>
+          <p:nvPr/>
+        </p:nvSpPr>
+        <p:spPr>
+          <a:xfrm>
+            <a:off x="5875461" y="1879600"/>
+            <a:ext cx="3154239" cy="1440313"/>
+          </a:xfrm>
+          <a:prstGeom prst="rect">
+            <a:avLst/>
+          </a:prstGeom>
+          <a:noFill/>
+          <a:ln w="34925">
+            <a:prstDash val="dash"/>
+          </a:ln>
+        </p:spPr>
+        <p:style>
+          <a:lnRef idx="2">
+            <a:schemeClr val="accent1"/>
+          </a:lnRef>
+          <a:fillRef idx="1">
+            <a:schemeClr val="lt1"/>
+          </a:fillRef>
+          <a:effectRef idx="0">
+            <a:schemeClr val="accent1"/>
+          </a:effectRef>
+          <a:fontRef idx="minor">
+            <a:schemeClr val="dk1"/>
+          </a:fontRef>
+        </p:style>
+        <p:txBody>
+          <a:bodyPr rtlCol="0" anchor="ctr"/>
+          <a:lstStyle/>
+          <a:p>
+            <a:pPr algn="ctr"/>
+            <a:endParaRPr kumimoji="1" lang="ja-JP" altLang="en-US"/>
+          </a:p>
+        </p:txBody>
+      </p:sp>
+      <p:cxnSp>
+        <p:nvCxnSpPr>
+          <p:cNvPr id="31" name="直線矢印コネクタ 30"/>
+          <p:cNvCxnSpPr/>
+          <p:nvPr/>
+        </p:nvCxnSpPr>
+        <p:spPr>
+          <a:xfrm flipV="1">
+            <a:off x="5465638" y="2307864"/>
+            <a:ext cx="687071" cy="3427"/>
+          </a:xfrm>
+          <a:prstGeom prst="straightConnector1">
+            <a:avLst/>
+          </a:prstGeom>
+          <a:ln>
+            <a:tailEnd type="arrow"/>
+          </a:ln>
+        </p:spPr>
+        <p:style>
+          <a:lnRef idx="2">
+            <a:schemeClr val="accent1"/>
+          </a:lnRef>
+          <a:fillRef idx="0">
+            <a:schemeClr val="accent1"/>
+          </a:fillRef>
+          <a:effectRef idx="1">
+            <a:schemeClr val="accent1"/>
+          </a:effectRef>
+          <a:fontRef idx="minor">
+            <a:schemeClr val="tx1"/>
+          </a:fontRef>
+        </p:style>
+      </p:cxnSp>
+      <p:cxnSp>
+        <p:nvCxnSpPr>
+          <p:cNvPr id="32" name="直線矢印コネクタ 31"/>
+          <p:cNvCxnSpPr/>
+          <p:nvPr/>
+        </p:nvCxnSpPr>
+        <p:spPr>
+          <a:xfrm>
+            <a:off x="5450225" y="2880665"/>
+            <a:ext cx="702484" cy="0"/>
+          </a:xfrm>
+          <a:prstGeom prst="straightConnector1">
+            <a:avLst/>
+          </a:prstGeom>
+          <a:ln>
+            <a:headEnd type="arrow"/>
+            <a:tailEnd type="none"/>
+          </a:ln>
+        </p:spPr>
+        <p:style>
+          <a:lnRef idx="2">
+            <a:schemeClr val="accent1"/>
+          </a:lnRef>
+          <a:fillRef idx="0">
+            <a:schemeClr val="accent1"/>
+          </a:fillRef>
+          <a:effectRef idx="1">
+            <a:schemeClr val="accent1"/>
+          </a:effectRef>
+          <a:fontRef idx="minor">
+            <a:schemeClr val="tx1"/>
+          </a:fontRef>
+        </p:style>
+      </p:cxnSp>
       <p:grpSp>
         <p:nvGrpSpPr>
-          <p:cNvPr id="20" name="グループ化 19"/>
+          <p:cNvPr id="21" name="グループ化 20"/>
           <p:cNvGrpSpPr/>
           <p:nvPr/>
         </p:nvGrpSpPr>
         <p:grpSpPr>
           <a:xfrm>
-            <a:off x="5338528" y="2066122"/>
+            <a:off x="6869422" y="2497066"/>
             <a:ext cx="1112438" cy="555462"/>
             <a:chOff x="5775544" y="3053452"/>
             <a:chExt cx="1112438" cy="555462"/>
@@ -16121,7 +16589,7 @@
         </p:grpSpPr>
         <p:sp>
           <p:nvSpPr>
-            <p:cNvPr id="21" name="星 24 20"/>
+            <p:cNvPr id="25" name="星 24 24"/>
             <p:cNvSpPr/>
             <p:nvPr/>
           </p:nvSpPr>
@@ -16159,7 +16627,7 @@
         </p:sp>
         <p:sp>
           <p:nvSpPr>
-            <p:cNvPr id="22" name="正方形/長方形 21"/>
+            <p:cNvPr id="26" name="正方形/長方形 25"/>
             <p:cNvSpPr/>
             <p:nvPr/>
           </p:nvSpPr>
@@ -16216,62 +16684,13 @@
       </p:grpSp>
       <p:sp>
         <p:nvSpPr>
-          <p:cNvPr id="23" name="角丸四角形 22"/>
-          <p:cNvSpPr/>
-          <p:nvPr/>
-        </p:nvSpPr>
-        <p:spPr>
-          <a:xfrm>
-            <a:off x="349250" y="1931421"/>
-            <a:ext cx="1690907" cy="759832"/>
-          </a:xfrm>
-          <a:prstGeom prst="roundRect">
-            <a:avLst/>
-          </a:prstGeom>
-        </p:spPr>
-        <p:style>
-          <a:lnRef idx="1">
-            <a:schemeClr val="accent1"/>
-          </a:lnRef>
-          <a:fillRef idx="3">
-            <a:schemeClr val="accent1"/>
-          </a:fillRef>
-          <a:effectRef idx="2">
-            <a:schemeClr val="accent1"/>
-          </a:effectRef>
-          <a:fontRef idx="minor">
-            <a:schemeClr val="lt1"/>
-          </a:fontRef>
-        </p:style>
-        <p:txBody>
-          <a:bodyPr rtlCol="0" anchor="ctr"/>
-          <a:lstStyle/>
-          <a:p>
-            <a:pPr algn="ctr"/>
-            <a:r>
-              <a:rPr kumimoji="1" lang="en-US" altLang="ja-JP" sz="1100" dirty="0" smtClean="0"/>
-              <a:t>DefaultMessageListener</a:t>
-            </a:r>
-          </a:p>
-          <a:p>
-            <a:pPr algn="ctr"/>
-            <a:r>
-              <a:rPr kumimoji="1" lang="en-US" altLang="ja-JP" sz="1100" dirty="0" smtClean="0"/>
-              <a:t>Container</a:t>
-            </a:r>
-            <a:endParaRPr kumimoji="1" lang="ja-JP" altLang="en-US" sz="1100" dirty="0"/>
-          </a:p>
-        </p:txBody>
-      </p:sp>
-      <p:sp>
-        <p:nvSpPr>
-          <p:cNvPr id="26" name="テキスト ボックス 25"/>
+          <p:cNvPr id="27" name="テキスト ボックス 26"/>
           <p:cNvSpPr txBox="1"/>
           <p:nvPr/>
         </p:nvSpPr>
         <p:spPr>
           <a:xfrm>
-            <a:off x="2027672" y="1810267"/>
+            <a:off x="6488838" y="2474106"/>
             <a:ext cx="385042" cy="307777"/>
           </a:xfrm>
           <a:prstGeom prst="rect">
@@ -16287,270 +16706,16 @@
           <a:p>
             <a:r>
               <a:rPr kumimoji="1" lang="en-US" altLang="ja-JP" sz="1400" dirty="0" smtClean="0"/>
-              <a:t>(1)</a:t>
+              <a:t>(3)</a:t>
             </a:r>
             <a:endParaRPr kumimoji="1" lang="ja-JP" altLang="en-US" sz="1400" dirty="0"/>
-          </a:p>
-        </p:txBody>
-      </p:sp>
-      <p:sp>
-        <p:nvSpPr>
-          <p:cNvPr id="27" name="テキスト ボックス 26"/>
-          <p:cNvSpPr txBox="1"/>
-          <p:nvPr/>
-        </p:nvSpPr>
-        <p:spPr>
-          <a:xfrm>
-            <a:off x="3866318" y="1787674"/>
-            <a:ext cx="385042" cy="307777"/>
-          </a:xfrm>
-          <a:prstGeom prst="rect">
-            <a:avLst/>
-          </a:prstGeom>
-          <a:noFill/>
-        </p:spPr>
-        <p:txBody>
-          <a:bodyPr wrap="none" rtlCol="0">
-            <a:spAutoFit/>
-          </a:bodyPr>
-          <a:lstStyle/>
-          <a:p>
-            <a:r>
-              <a:rPr kumimoji="1" lang="en-US" altLang="ja-JP" sz="1400" dirty="0" smtClean="0"/>
-              <a:t>(2)</a:t>
-            </a:r>
-            <a:endParaRPr kumimoji="1" lang="ja-JP" altLang="en-US" sz="1400" dirty="0"/>
-          </a:p>
-        </p:txBody>
-      </p:sp>
-      <p:sp>
-        <p:nvSpPr>
-          <p:cNvPr id="28" name="テキスト ボックス 27"/>
-          <p:cNvSpPr txBox="1"/>
-          <p:nvPr/>
-        </p:nvSpPr>
-        <p:spPr>
-          <a:xfrm>
-            <a:off x="5319922" y="1956225"/>
-            <a:ext cx="385042" cy="307777"/>
-          </a:xfrm>
-          <a:prstGeom prst="rect">
-            <a:avLst/>
-          </a:prstGeom>
-          <a:noFill/>
-        </p:spPr>
-        <p:txBody>
-          <a:bodyPr wrap="none" rtlCol="0">
-            <a:spAutoFit/>
-          </a:bodyPr>
-          <a:lstStyle/>
-          <a:p>
-            <a:r>
-              <a:rPr kumimoji="1" lang="en-US" altLang="ja-JP" sz="1400" dirty="0" smtClean="0"/>
-              <a:t>(3)</a:t>
-            </a:r>
-            <a:endParaRPr kumimoji="1" lang="ja-JP" altLang="en-US" sz="1400" dirty="0"/>
-          </a:p>
-        </p:txBody>
-      </p:sp>
-      <p:sp>
-        <p:nvSpPr>
-          <p:cNvPr id="30" name="テキスト ボックス 29"/>
-          <p:cNvSpPr txBox="1"/>
-          <p:nvPr/>
-        </p:nvSpPr>
-        <p:spPr>
-          <a:xfrm>
-            <a:off x="2027672" y="2299709"/>
-            <a:ext cx="385042" cy="307777"/>
-          </a:xfrm>
-          <a:prstGeom prst="rect">
-            <a:avLst/>
-          </a:prstGeom>
-          <a:noFill/>
-        </p:spPr>
-        <p:txBody>
-          <a:bodyPr wrap="none" rtlCol="0">
-            <a:spAutoFit/>
-          </a:bodyPr>
-          <a:lstStyle/>
-          <a:p>
-            <a:r>
-              <a:rPr kumimoji="1" lang="en-US" altLang="ja-JP" sz="1400" dirty="0" smtClean="0"/>
-              <a:t>(5)</a:t>
-            </a:r>
-            <a:endParaRPr kumimoji="1" lang="ja-JP" altLang="en-US" sz="1400" dirty="0"/>
-          </a:p>
-        </p:txBody>
-      </p:sp>
-      <p:sp>
-        <p:nvSpPr>
-          <p:cNvPr id="31" name="テキスト ボックス 30"/>
-          <p:cNvSpPr txBox="1"/>
-          <p:nvPr/>
-        </p:nvSpPr>
-        <p:spPr>
-          <a:xfrm>
-            <a:off x="3866318" y="2304764"/>
-            <a:ext cx="385042" cy="307777"/>
-          </a:xfrm>
-          <a:prstGeom prst="rect">
-            <a:avLst/>
-          </a:prstGeom>
-          <a:noFill/>
-        </p:spPr>
-        <p:txBody>
-          <a:bodyPr wrap="none" rtlCol="0">
-            <a:spAutoFit/>
-          </a:bodyPr>
-          <a:lstStyle/>
-          <a:p>
-            <a:r>
-              <a:rPr kumimoji="1" lang="en-US" altLang="ja-JP" sz="1400" dirty="0" smtClean="0"/>
-              <a:t>(4)</a:t>
-            </a:r>
-            <a:endParaRPr kumimoji="1" lang="ja-JP" altLang="en-US" sz="1400" dirty="0"/>
-          </a:p>
-        </p:txBody>
-      </p:sp>
-      <p:sp>
-        <p:nvSpPr>
-          <p:cNvPr id="24" name="テキスト ボックス 23"/>
-          <p:cNvSpPr txBox="1"/>
-          <p:nvPr/>
-        </p:nvSpPr>
-        <p:spPr>
-          <a:xfrm>
-            <a:off x="3401508" y="1135168"/>
-            <a:ext cx="1320440" cy="430887"/>
-          </a:xfrm>
-          <a:prstGeom prst="rect">
-            <a:avLst/>
-          </a:prstGeom>
-          <a:noFill/>
-          <a:ln>
-            <a:noFill/>
-          </a:ln>
-        </p:spPr>
-        <p:txBody>
-          <a:bodyPr vert="horz" wrap="square" rtlCol="0">
-            <a:spAutoFit/>
-          </a:bodyPr>
-          <a:lstStyle/>
-          <a:p>
-            <a:r>
-              <a:rPr kumimoji="1" lang="en-US" altLang="ja-JP" sz="1100" dirty="0" smtClean="0">
-                <a:solidFill>
-                  <a:schemeClr val="accent1"/>
-                </a:solidFill>
-              </a:rPr>
-              <a:t>DB</a:t>
-            </a:r>
-            <a:r>
-              <a:rPr lang="ja-JP" altLang="en-US" sz="1100" dirty="0">
-                <a:solidFill>
-                  <a:schemeClr val="accent1"/>
-                </a:solidFill>
-              </a:rPr>
-              <a:t> </a:t>
-            </a:r>
-            <a:r>
-              <a:rPr lang="en-US" altLang="ja-JP" sz="1100" dirty="0" smtClean="0">
-                <a:solidFill>
-                  <a:schemeClr val="accent1"/>
-                </a:solidFill>
-              </a:rPr>
-              <a:t>Transaction</a:t>
-            </a:r>
-          </a:p>
-          <a:p>
-            <a:r>
-              <a:rPr lang="en-US" altLang="ja-JP" sz="1100" dirty="0" smtClean="0">
-                <a:solidFill>
-                  <a:schemeClr val="accent1"/>
-                </a:solidFill>
-              </a:rPr>
-              <a:t>Boundary</a:t>
-            </a:r>
-            <a:endParaRPr lang="ja-JP" altLang="en-US" sz="1100" dirty="0">
-              <a:solidFill>
-                <a:schemeClr val="accent1"/>
-              </a:solidFill>
-            </a:endParaRPr>
-          </a:p>
-        </p:txBody>
-      </p:sp>
-      <p:sp>
-        <p:nvSpPr>
-          <p:cNvPr id="32" name="テキスト ボックス 31"/>
-          <p:cNvSpPr txBox="1"/>
-          <p:nvPr/>
-        </p:nvSpPr>
-        <p:spPr>
-          <a:xfrm>
-            <a:off x="1556110" y="1103707"/>
-            <a:ext cx="1320440" cy="430887"/>
-          </a:xfrm>
-          <a:prstGeom prst="rect">
-            <a:avLst/>
-          </a:prstGeom>
-          <a:noFill/>
-          <a:ln>
-            <a:noFill/>
-          </a:ln>
-        </p:spPr>
-        <p:txBody>
-          <a:bodyPr vert="horz" wrap="square" rtlCol="0">
-            <a:spAutoFit/>
-          </a:bodyPr>
-          <a:lstStyle/>
-          <a:p>
-            <a:r>
-              <a:rPr lang="en-US" altLang="ja-JP" sz="1100" dirty="0" smtClean="0">
-                <a:solidFill>
-                  <a:srgbClr val="7030A0"/>
-                </a:solidFill>
-              </a:rPr>
-              <a:t>JMS</a:t>
-            </a:r>
-            <a:r>
-              <a:rPr kumimoji="1" lang="ja-JP" altLang="en-US" sz="1100" dirty="0" smtClean="0">
-                <a:solidFill>
-                  <a:srgbClr val="7030A0"/>
-                </a:solidFill>
-              </a:rPr>
-              <a:t> </a:t>
-            </a:r>
-            <a:r>
-              <a:rPr kumimoji="1" lang="en-US" altLang="ja-JP" sz="1100" dirty="0" smtClean="0">
-                <a:solidFill>
-                  <a:srgbClr val="7030A0"/>
-                </a:solidFill>
-              </a:rPr>
-              <a:t>Transaction </a:t>
-            </a:r>
-          </a:p>
-          <a:p>
-            <a:r>
-              <a:rPr lang="en-US" altLang="ja-JP" sz="1100" dirty="0" smtClean="0">
-                <a:solidFill>
-                  <a:srgbClr val="7030A0"/>
-                </a:solidFill>
-              </a:rPr>
-              <a:t>Boundary</a:t>
-            </a:r>
-            <a:endParaRPr kumimoji="1" lang="ja-JP" altLang="en-US" sz="1100" dirty="0">
-              <a:solidFill>
-                <a:srgbClr val="7030A0"/>
-              </a:solidFill>
-            </a:endParaRPr>
           </a:p>
         </p:txBody>
       </p:sp>
     </p:spTree>
     <p:extLst>
       <p:ext uri="{BB962C8B-B14F-4D97-AF65-F5344CB8AC3E}">
-        <p14:creationId xmlns:p14="http://schemas.microsoft.com/office/powerpoint/2010/main" val="1065821421"/>
+        <p14:creationId xmlns:p14="http://schemas.microsoft.com/office/powerpoint/2010/main" val="3423656860"/>
       </p:ext>
     </p:extLst>
   </p:cSld>
@@ -16586,18 +16751,21 @@
       </p:grpSpPr>
       <p:sp>
         <p:nvSpPr>
-          <p:cNvPr id="31" name="角丸四角形 30"/>
+          <p:cNvPr id="38" name="角丸四角形 37"/>
           <p:cNvSpPr/>
           <p:nvPr/>
         </p:nvSpPr>
         <p:spPr>
           <a:xfrm>
-            <a:off x="4343016" y="1107830"/>
-            <a:ext cx="2614832" cy="2065637"/>
+            <a:off x="-270608" y="842509"/>
+            <a:ext cx="2206576" cy="3028968"/>
           </a:xfrm>
           <a:prstGeom prst="roundRect">
             <a:avLst/>
           </a:prstGeom>
+          <a:solidFill>
+            <a:srgbClr val="92D050"/>
+          </a:solidFill>
         </p:spPr>
         <p:style>
           <a:lnRef idx="1">
@@ -16619,21 +16787,18 @@
           <a:p>
             <a:pPr algn="ctr"/>
             <a:r>
-              <a:rPr lang="en-US" altLang="ja-JP" sz="2000" b="1" dirty="0">
-                <a:solidFill>
-                  <a:schemeClr val="bg1"/>
-                </a:solidFill>
+              <a:rPr lang="en-US" altLang="ja-JP" dirty="0" err="1" smtClean="0">
                 <a:effectLst>
-                  <a:outerShdw blurRad="50800" dist="38100" dir="2700000" algn="tl" rotWithShape="0">
-                    <a:prstClr val="black">
-                      <a:alpha val="40000"/>
-                    </a:prstClr>
+                  <a:outerShdw blurRad="38100" dist="38100" dir="2700000" algn="tl">
+                    <a:srgbClr val="000000">
+                      <a:alpha val="43137"/>
+                    </a:srgbClr>
                   </a:outerShdw>
                 </a:effectLst>
               </a:rPr>
-              <a:t>MessageListener</a:t>
-            </a:r>
-            <a:endParaRPr kumimoji="1" lang="en-US" altLang="ja-JP" sz="2000" b="1" dirty="0" smtClean="0">
+              <a:t>DefaultMessage</a:t>
+            </a:r>
+            <a:endParaRPr lang="en-US" altLang="ja-JP" dirty="0" smtClean="0">
               <a:effectLst>
                 <a:outerShdw blurRad="38100" dist="38100" dir="2700000" algn="tl">
                   <a:srgbClr val="000000">
@@ -16645,39 +16810,196 @@
           </a:p>
           <a:p>
             <a:pPr algn="ctr"/>
-            <a:endParaRPr lang="en-US" altLang="ja-JP" sz="1600" dirty="0"/>
-          </a:p>
-          <a:p>
-            <a:pPr algn="ctr"/>
-            <a:endParaRPr lang="en-US" altLang="ja-JP" sz="1100" dirty="0" smtClean="0"/>
+            <a:r>
+              <a:rPr lang="en-US" altLang="ja-JP" dirty="0" err="1" smtClean="0">
+                <a:effectLst>
+                  <a:outerShdw blurRad="38100" dist="38100" dir="2700000" algn="tl">
+                    <a:srgbClr val="000000">
+                      <a:alpha val="43137"/>
+                    </a:srgbClr>
+                  </a:outerShdw>
+                </a:effectLst>
+              </a:rPr>
+              <a:t>ListenerContainer</a:t>
+            </a:r>
+            <a:endParaRPr lang="ja-JP" altLang="en-US" dirty="0">
+              <a:effectLst>
+                <a:outerShdw blurRad="38100" dist="38100" dir="2700000" algn="tl">
+                  <a:srgbClr val="000000">
+                    <a:alpha val="43137"/>
+                  </a:srgbClr>
+                </a:outerShdw>
+              </a:effectLst>
+            </a:endParaRPr>
           </a:p>
         </p:txBody>
       </p:sp>
       <p:sp>
         <p:nvSpPr>
-          <p:cNvPr id="60" name="正方形/長方形 59"/>
+          <p:cNvPr id="40" name="テキスト ボックス 39"/>
+          <p:cNvSpPr txBox="1"/>
+          <p:nvPr/>
+        </p:nvSpPr>
+        <p:spPr>
+          <a:xfrm>
+            <a:off x="5726362" y="1710180"/>
+            <a:ext cx="2604590" cy="338554"/>
+          </a:xfrm>
+          <a:prstGeom prst="rect">
+            <a:avLst/>
+          </a:prstGeom>
+          <a:noFill/>
+          <a:ln>
+            <a:noFill/>
+          </a:ln>
+        </p:spPr>
+        <p:txBody>
+          <a:bodyPr vert="horz" wrap="square" rtlCol="0">
+            <a:spAutoFit/>
+          </a:bodyPr>
+          <a:lstStyle/>
+          <a:p>
+            <a:r>
+              <a:rPr kumimoji="1" lang="en-US" altLang="ja-JP" sz="1600" dirty="0" smtClean="0">
+                <a:solidFill>
+                  <a:schemeClr val="accent1"/>
+                </a:solidFill>
+              </a:rPr>
+              <a:t>DB</a:t>
+            </a:r>
+            <a:r>
+              <a:rPr lang="ja-JP" altLang="en-US" sz="1600" dirty="0">
+                <a:solidFill>
+                  <a:schemeClr val="accent1"/>
+                </a:solidFill>
+              </a:rPr>
+              <a:t> </a:t>
+            </a:r>
+            <a:r>
+              <a:rPr lang="en-US" altLang="ja-JP" sz="1600" dirty="0" smtClean="0">
+                <a:solidFill>
+                  <a:schemeClr val="accent1"/>
+                </a:solidFill>
+              </a:rPr>
+              <a:t>Transaction</a:t>
+            </a:r>
+            <a:r>
+              <a:rPr lang="ja-JP" altLang="en-US" sz="1600" dirty="0" smtClean="0">
+                <a:solidFill>
+                  <a:schemeClr val="accent1"/>
+                </a:solidFill>
+              </a:rPr>
+              <a:t> </a:t>
+            </a:r>
+            <a:r>
+              <a:rPr lang="en-US" altLang="ja-JP" sz="1600" dirty="0" smtClean="0">
+                <a:solidFill>
+                  <a:schemeClr val="accent1"/>
+                </a:solidFill>
+              </a:rPr>
+              <a:t>Boundary</a:t>
+            </a:r>
+            <a:endParaRPr lang="ja-JP" altLang="en-US" sz="1600" dirty="0">
+              <a:solidFill>
+                <a:schemeClr val="accent1"/>
+              </a:solidFill>
+            </a:endParaRPr>
+          </a:p>
+        </p:txBody>
+      </p:sp>
+      <p:sp>
+        <p:nvSpPr>
+          <p:cNvPr id="41" name="テキスト ボックス 40"/>
+          <p:cNvSpPr txBox="1"/>
+          <p:nvPr/>
+        </p:nvSpPr>
+        <p:spPr>
+          <a:xfrm>
+            <a:off x="5699930" y="1152218"/>
+            <a:ext cx="2623715" cy="338554"/>
+          </a:xfrm>
+          <a:prstGeom prst="rect">
+            <a:avLst/>
+          </a:prstGeom>
+          <a:noFill/>
+          <a:ln>
+            <a:noFill/>
+          </a:ln>
+        </p:spPr>
+        <p:txBody>
+          <a:bodyPr vert="horz" wrap="square" rtlCol="0">
+            <a:spAutoFit/>
+          </a:bodyPr>
+          <a:lstStyle/>
+          <a:p>
+            <a:r>
+              <a:rPr lang="en-US" altLang="ja-JP" sz="1600" dirty="0" smtClean="0">
+                <a:solidFill>
+                  <a:srgbClr val="7030A0"/>
+                </a:solidFill>
+              </a:rPr>
+              <a:t>JMS</a:t>
+            </a:r>
+            <a:r>
+              <a:rPr kumimoji="1" lang="ja-JP" altLang="en-US" sz="1600" dirty="0" smtClean="0">
+                <a:solidFill>
+                  <a:srgbClr val="7030A0"/>
+                </a:solidFill>
+              </a:rPr>
+              <a:t> </a:t>
+            </a:r>
+            <a:r>
+              <a:rPr kumimoji="1" lang="en-US" altLang="ja-JP" sz="1600" dirty="0" smtClean="0">
+                <a:solidFill>
+                  <a:srgbClr val="7030A0"/>
+                </a:solidFill>
+              </a:rPr>
+              <a:t>Transaction</a:t>
+            </a:r>
+            <a:r>
+              <a:rPr kumimoji="1" lang="ja-JP" altLang="en-US" sz="1600" dirty="0" smtClean="0">
+                <a:solidFill>
+                  <a:srgbClr val="7030A0"/>
+                </a:solidFill>
+              </a:rPr>
+              <a:t> </a:t>
+            </a:r>
+            <a:r>
+              <a:rPr lang="en-US" altLang="ja-JP" sz="1600" dirty="0" smtClean="0">
+                <a:solidFill>
+                  <a:srgbClr val="7030A0"/>
+                </a:solidFill>
+              </a:rPr>
+              <a:t>Boundary</a:t>
+            </a:r>
+            <a:endParaRPr kumimoji="1" lang="ja-JP" altLang="en-US" sz="1600" dirty="0">
+              <a:solidFill>
+                <a:srgbClr val="7030A0"/>
+              </a:solidFill>
+            </a:endParaRPr>
+          </a:p>
+        </p:txBody>
+      </p:sp>
+      <p:sp>
+        <p:nvSpPr>
+          <p:cNvPr id="42" name="角丸四角形 41"/>
           <p:cNvSpPr/>
           <p:nvPr/>
         </p:nvSpPr>
         <p:spPr>
           <a:xfrm>
-            <a:off x="2307690" y="1832860"/>
-            <a:ext cx="4504590" cy="895809"/>
+            <a:off x="2726150" y="842509"/>
+            <a:ext cx="2614832" cy="3028968"/>
           </a:xfrm>
-          <a:prstGeom prst="rect">
+          <a:prstGeom prst="roundRect">
             <a:avLst/>
           </a:prstGeom>
           <a:solidFill>
-            <a:schemeClr val="accent2">
-              <a:lumMod val="75000"/>
-              <a:alpha val="17000"/>
+            <a:schemeClr val="accent4">
+              <a:lumMod val="60000"/>
+              <a:lumOff val="40000"/>
             </a:schemeClr>
           </a:solidFill>
-          <a:ln>
-            <a:solidFill>
-              <a:schemeClr val="tx1"/>
-            </a:solidFill>
-          </a:ln>
         </p:spPr>
         <p:style>
           <a:lnRef idx="1">
@@ -16694,29 +17016,47 @@
           </a:fontRef>
         </p:style>
         <p:txBody>
-          <a:bodyPr rtlCol="0" anchor="ctr"/>
+          <a:bodyPr rtlCol="0" anchor="t"/>
           <a:lstStyle/>
           <a:p>
             <a:pPr algn="ctr"/>
-            <a:endParaRPr kumimoji="1" lang="ja-JP" altLang="en-US" dirty="0"/>
+            <a:r>
+              <a:rPr lang="en-US" altLang="ja-JP" b="1" dirty="0" err="1" smtClean="0">
+                <a:solidFill>
+                  <a:schemeClr val="bg1"/>
+                </a:solidFill>
+                <a:effectLst>
+                  <a:outerShdw blurRad="50800" dist="38100" dir="2700000" algn="tl" rotWithShape="0">
+                    <a:prstClr val="black">
+                      <a:alpha val="40000"/>
+                    </a:prstClr>
+                  </a:outerShdw>
+                </a:effectLst>
+              </a:rPr>
+              <a:t>MessageListener</a:t>
+            </a:r>
+            <a:endParaRPr lang="en-US" altLang="ja-JP" sz="1050" dirty="0"/>
           </a:p>
         </p:txBody>
       </p:sp>
       <p:cxnSp>
         <p:nvCxnSpPr>
-          <p:cNvPr id="46" name="直線矢印コネクタ 45"/>
+          <p:cNvPr id="44" name="直線矢印コネクタ 43"/>
           <p:cNvCxnSpPr/>
           <p:nvPr/>
         </p:nvCxnSpPr>
         <p:spPr>
-          <a:xfrm flipV="1">
-            <a:off x="2040157" y="2064673"/>
-            <a:ext cx="2290431" cy="18617"/>
+          <a:xfrm>
+            <a:off x="1937479" y="1616833"/>
+            <a:ext cx="788671" cy="2255"/>
           </a:xfrm>
           <a:prstGeom prst="straightConnector1">
             <a:avLst/>
           </a:prstGeom>
           <a:ln>
+            <a:solidFill>
+              <a:schemeClr val="accent4"/>
+            </a:solidFill>
             <a:tailEnd type="arrow"/>
           </a:ln>
         </p:spPr>
@@ -16737,150 +17077,23 @@
       </p:cxnSp>
       <p:sp>
         <p:nvSpPr>
-          <p:cNvPr id="51" name="正方形/長方形 50"/>
+          <p:cNvPr id="45" name="線吹き出し 2 (枠付き) 44"/>
           <p:cNvSpPr/>
           <p:nvPr/>
         </p:nvSpPr>
         <p:spPr>
           <a:xfrm>
-            <a:off x="4165600" y="1882091"/>
-            <a:ext cx="2578099" cy="797236"/>
-          </a:xfrm>
-          <a:prstGeom prst="rect">
-            <a:avLst/>
-          </a:prstGeom>
-          <a:solidFill>
-            <a:schemeClr val="accent1">
-              <a:alpha val="11000"/>
-            </a:schemeClr>
-          </a:solidFill>
-          <a:ln>
-            <a:solidFill>
-              <a:schemeClr val="tx1"/>
-            </a:solidFill>
-          </a:ln>
-        </p:spPr>
-        <p:style>
-          <a:lnRef idx="1">
-            <a:schemeClr val="accent1"/>
-          </a:lnRef>
-          <a:fillRef idx="3">
-            <a:schemeClr val="accent1"/>
-          </a:fillRef>
-          <a:effectRef idx="2">
-            <a:schemeClr val="accent1"/>
-          </a:effectRef>
-          <a:fontRef idx="minor">
-            <a:schemeClr val="lt1"/>
-          </a:fontRef>
-        </p:style>
-        <p:txBody>
-          <a:bodyPr rtlCol="0" anchor="ctr"/>
-          <a:lstStyle/>
-          <a:p>
-            <a:pPr algn="ctr"/>
-            <a:endParaRPr kumimoji="1" lang="ja-JP" altLang="en-US" dirty="0"/>
-          </a:p>
-        </p:txBody>
-      </p:sp>
-      <p:cxnSp>
-        <p:nvCxnSpPr>
-          <p:cNvPr id="29" name="直線矢印コネクタ 28"/>
-          <p:cNvCxnSpPr/>
-          <p:nvPr/>
-        </p:nvCxnSpPr>
-        <p:spPr>
-          <a:xfrm>
-            <a:off x="4153088" y="1450768"/>
-            <a:ext cx="9269" cy="1395571"/>
-          </a:xfrm>
-          <a:prstGeom prst="straightConnector1">
-            <a:avLst/>
-          </a:prstGeom>
-          <a:ln w="31750">
-            <a:solidFill>
-              <a:schemeClr val="tx2">
-                <a:lumMod val="60000"/>
-                <a:lumOff val="40000"/>
-              </a:schemeClr>
-            </a:solidFill>
-            <a:prstDash val="dash"/>
-            <a:headEnd type="none"/>
-            <a:tailEnd type="none"/>
-          </a:ln>
-        </p:spPr>
-        <p:style>
-          <a:lnRef idx="2">
-            <a:schemeClr val="accent1"/>
-          </a:lnRef>
-          <a:fillRef idx="0">
-            <a:schemeClr val="accent1"/>
-          </a:fillRef>
-          <a:effectRef idx="1">
-            <a:schemeClr val="accent1"/>
-          </a:effectRef>
-          <a:fontRef idx="minor">
-            <a:schemeClr val="tx1"/>
-          </a:fontRef>
-        </p:style>
-      </p:cxnSp>
-      <p:cxnSp>
-        <p:nvCxnSpPr>
-          <p:cNvPr id="43" name="直線矢印コネクタ 42"/>
-          <p:cNvCxnSpPr/>
-          <p:nvPr/>
-        </p:nvCxnSpPr>
-        <p:spPr>
-          <a:xfrm>
-            <a:off x="2302730" y="1462136"/>
-            <a:ext cx="0" cy="1459163"/>
-          </a:xfrm>
-          <a:prstGeom prst="straightConnector1">
-            <a:avLst/>
-          </a:prstGeom>
-          <a:ln w="31750">
-            <a:solidFill>
-              <a:srgbClr val="7030A0"/>
-            </a:solidFill>
-            <a:prstDash val="dash"/>
-            <a:headEnd type="none"/>
-            <a:tailEnd type="none" w="sm" len="sm"/>
-          </a:ln>
-        </p:spPr>
-        <p:style>
-          <a:lnRef idx="2">
-            <a:schemeClr val="accent1"/>
-          </a:lnRef>
-          <a:fillRef idx="0">
-            <a:schemeClr val="accent1"/>
-          </a:fillRef>
-          <a:effectRef idx="1">
-            <a:schemeClr val="accent1"/>
-          </a:effectRef>
-          <a:fontRef idx="minor">
-            <a:schemeClr val="tx1"/>
-          </a:fontRef>
-        </p:style>
-      </p:cxnSp>
-      <p:sp>
-        <p:nvSpPr>
-          <p:cNvPr id="65" name="線吹き出し 2 (枠付き) 64"/>
-          <p:cNvSpPr/>
-          <p:nvPr/>
-        </p:nvSpPr>
-        <p:spPr>
-          <a:xfrm>
-            <a:off x="4559984" y="2763350"/>
+            <a:off x="5787658" y="3629825"/>
             <a:ext cx="1284243" cy="410117"/>
           </a:xfrm>
           <a:prstGeom prst="borderCallout2">
             <a:avLst>
               <a:gd name="adj1" fmla="val 29898"/>
               <a:gd name="adj2" fmla="val 567"/>
-              <a:gd name="adj3" fmla="val 12669"/>
-              <a:gd name="adj4" fmla="val -12783"/>
-              <a:gd name="adj5" fmla="val -32261"/>
-              <a:gd name="adj6" fmla="val -27974"/>
+              <a:gd name="adj3" fmla="val 18750"/>
+              <a:gd name="adj4" fmla="val -16667"/>
+              <a:gd name="adj5" fmla="val -123247"/>
+              <a:gd name="adj6" fmla="val -17132"/>
             </a:avLst>
           </a:prstGeom>
           <a:solidFill>
@@ -16917,7 +17130,7 @@
                   <a:schemeClr val="tx1"/>
                 </a:solidFill>
               </a:rPr>
-              <a:t>Commit</a:t>
+              <a:t>Commit </a:t>
             </a:r>
           </a:p>
           <a:p>
@@ -16948,23 +17161,23 @@
       </p:sp>
       <p:sp>
         <p:nvSpPr>
-          <p:cNvPr id="66" name="線吹き出し 2 (枠付き) 65"/>
+          <p:cNvPr id="47" name="線吹き出し 2 (枠付き) 46"/>
           <p:cNvSpPr/>
           <p:nvPr/>
         </p:nvSpPr>
         <p:spPr>
           <a:xfrm>
-            <a:off x="2653757" y="2763350"/>
-            <a:ext cx="1639159" cy="594992"/>
+            <a:off x="2388016" y="4111192"/>
+            <a:ext cx="1609355" cy="645956"/>
           </a:xfrm>
           <a:prstGeom prst="borderCallout2">
             <a:avLst>
               <a:gd name="adj1" fmla="val 26182"/>
               <a:gd name="adj2" fmla="val -620"/>
               <a:gd name="adj3" fmla="val 18750"/>
-              <a:gd name="adj4" fmla="val -15184"/>
-              <a:gd name="adj5" fmla="val 733"/>
-              <a:gd name="adj6" fmla="val -20939"/>
+              <a:gd name="adj4" fmla="val -16667"/>
+              <a:gd name="adj5" fmla="val -74545"/>
+              <a:gd name="adj6" fmla="val -17512"/>
             </a:avLst>
           </a:prstGeom>
           <a:solidFill>
@@ -17012,50 +17225,489 @@
                   <a:schemeClr val="tx1"/>
                 </a:solidFill>
               </a:rPr>
-              <a:t>JMS Transaction</a:t>
-            </a:r>
-            <a:r>
-              <a:rPr lang="ja-JP" altLang="en-US" sz="1400" dirty="0">
+              <a:t>JMS</a:t>
+            </a:r>
+            <a:r>
+              <a:rPr lang="ja-JP" altLang="en-US" sz="1400" dirty="0" smtClean="0">
                 <a:solidFill>
                   <a:schemeClr val="tx1"/>
                 </a:solidFill>
               </a:rPr>
               <a:t> </a:t>
             </a:r>
-            <a:endParaRPr lang="en-US" altLang="ja-JP" sz="1400" dirty="0" smtClean="0">
-              <a:solidFill>
-                <a:schemeClr val="tx1"/>
-              </a:solidFill>
-            </a:endParaRPr>
-          </a:p>
-          <a:p>
-            <a:pPr algn="ctr"/>
             <a:r>
               <a:rPr lang="en-US" altLang="ja-JP" sz="1400" dirty="0" smtClean="0">
                 <a:solidFill>
                   <a:schemeClr val="tx1"/>
                 </a:solidFill>
               </a:rPr>
-              <a:t>Failed</a:t>
-            </a:r>
-            <a:endParaRPr kumimoji="1" lang="ja-JP" altLang="en-US" sz="1400" dirty="0">
-              <a:solidFill>
-                <a:schemeClr val="tx1"/>
-              </a:solidFill>
-            </a:endParaRPr>
+              <a:t>Transaction</a:t>
+            </a:r>
+          </a:p>
+          <a:p>
+            <a:pPr algn="ctr"/>
+            <a:r>
+              <a:rPr lang="en-US" altLang="ja-JP" sz="1400" dirty="0" smtClean="0">
+                <a:solidFill>
+                  <a:schemeClr val="tx1"/>
+                </a:solidFill>
+              </a:rPr>
+              <a:t>Faile</a:t>
+            </a:r>
+            <a:r>
+              <a:rPr lang="en-US" altLang="ja-JP" sz="1400" dirty="0">
+                <a:solidFill>
+                  <a:schemeClr val="tx1"/>
+                </a:solidFill>
+              </a:rPr>
+              <a:t>d</a:t>
+            </a:r>
           </a:p>
         </p:txBody>
       </p:sp>
       <p:cxnSp>
         <p:nvCxnSpPr>
-          <p:cNvPr id="39" name="直線矢印コネクタ 38"/>
+          <p:cNvPr id="48" name="直線矢印コネクタ 47"/>
+          <p:cNvCxnSpPr/>
+          <p:nvPr/>
+        </p:nvCxnSpPr>
+        <p:spPr>
+          <a:xfrm>
+            <a:off x="1937479" y="3310684"/>
+            <a:ext cx="788671" cy="0"/>
+          </a:xfrm>
+          <a:prstGeom prst="straightConnector1">
+            <a:avLst/>
+          </a:prstGeom>
+          <a:ln>
+            <a:solidFill>
+              <a:schemeClr val="accent4"/>
+            </a:solidFill>
+            <a:headEnd type="arrow"/>
+            <a:tailEnd type="none"/>
+          </a:ln>
+        </p:spPr>
+        <p:style>
+          <a:lnRef idx="2">
+            <a:schemeClr val="accent1"/>
+          </a:lnRef>
+          <a:fillRef idx="0">
+            <a:schemeClr val="accent1"/>
+          </a:fillRef>
+          <a:effectRef idx="1">
+            <a:schemeClr val="accent1"/>
+          </a:effectRef>
+          <a:fontRef idx="minor">
+            <a:schemeClr val="tx1"/>
+          </a:fontRef>
+        </p:style>
+      </p:cxnSp>
+      <p:sp>
+        <p:nvSpPr>
+          <p:cNvPr id="49" name="テキスト ボックス 48"/>
+          <p:cNvSpPr txBox="1"/>
+          <p:nvPr/>
+        </p:nvSpPr>
+        <p:spPr>
+          <a:xfrm>
+            <a:off x="2720046" y="1252638"/>
+            <a:ext cx="2664832" cy="2092881"/>
+          </a:xfrm>
+          <a:prstGeom prst="rect">
+            <a:avLst/>
+          </a:prstGeom>
+          <a:noFill/>
+        </p:spPr>
+        <p:txBody>
+          <a:bodyPr wrap="none" rtlCol="0">
+            <a:spAutoFit/>
+          </a:bodyPr>
+          <a:lstStyle/>
+          <a:p>
+            <a:r>
+              <a:rPr lang="en-US" altLang="ja-JP" sz="1300" dirty="0" smtClean="0"/>
+              <a:t>@JmsListener(…)</a:t>
+            </a:r>
+          </a:p>
+          <a:p>
+            <a:r>
+              <a:rPr lang="en-US" altLang="ja-JP" sz="1300" dirty="0" smtClean="0"/>
+              <a:t>public void receiveTodo(Todo </a:t>
+            </a:r>
+            <a:r>
+              <a:rPr lang="en-US" altLang="ja-JP" sz="1300" dirty="0"/>
+              <a:t>todo) {</a:t>
+            </a:r>
+          </a:p>
+          <a:p>
+            <a:endParaRPr lang="en-US" altLang="ja-JP" sz="1300" dirty="0"/>
+          </a:p>
+          <a:p>
+            <a:r>
+              <a:rPr lang="en-US" altLang="ja-JP" sz="1300" dirty="0" smtClean="0"/>
+              <a:t>    // omitted</a:t>
+            </a:r>
+          </a:p>
+          <a:p>
+            <a:r>
+              <a:rPr lang="en-US" altLang="ja-JP" sz="1300" dirty="0" smtClean="0"/>
+              <a:t>    todoService.insertTodo(todo)</a:t>
+            </a:r>
+          </a:p>
+          <a:p>
+            <a:endParaRPr lang="en-US" altLang="ja-JP" sz="1300" dirty="0" smtClean="0"/>
+          </a:p>
+          <a:p>
+            <a:endParaRPr lang="en-US" altLang="ja-JP" sz="1300" dirty="0" smtClean="0"/>
+          </a:p>
+          <a:p>
+            <a:r>
+              <a:rPr lang="en-US" altLang="ja-JP" sz="1300" dirty="0" smtClean="0"/>
+              <a:t>    // omitted</a:t>
+            </a:r>
+          </a:p>
+          <a:p>
+            <a:endParaRPr lang="en-US" altLang="ja-JP" sz="1300" dirty="0"/>
+          </a:p>
+          <a:p>
+            <a:r>
+              <a:rPr lang="en-US" altLang="ja-JP" sz="1300" dirty="0" smtClean="0"/>
+              <a:t>}</a:t>
+            </a:r>
+            <a:endParaRPr kumimoji="1" lang="ja-JP" altLang="en-US" sz="1300" dirty="0"/>
+          </a:p>
+        </p:txBody>
+      </p:sp>
+      <p:sp>
+        <p:nvSpPr>
+          <p:cNvPr id="50" name="テキスト ボックス 49"/>
+          <p:cNvSpPr txBox="1"/>
+          <p:nvPr/>
+        </p:nvSpPr>
+        <p:spPr>
+          <a:xfrm>
+            <a:off x="1931480" y="1175809"/>
+            <a:ext cx="385042" cy="307777"/>
+          </a:xfrm>
+          <a:prstGeom prst="rect">
+            <a:avLst/>
+          </a:prstGeom>
+          <a:noFill/>
+        </p:spPr>
+        <p:txBody>
+          <a:bodyPr wrap="none" rtlCol="0">
+            <a:spAutoFit/>
+          </a:bodyPr>
+          <a:lstStyle/>
+          <a:p>
+            <a:r>
+              <a:rPr kumimoji="1" lang="en-US" altLang="ja-JP" sz="1400" dirty="0" smtClean="0"/>
+              <a:t>(1)</a:t>
+            </a:r>
+            <a:endParaRPr kumimoji="1" lang="ja-JP" altLang="en-US" sz="1400" dirty="0"/>
+          </a:p>
+        </p:txBody>
+      </p:sp>
+      <p:sp>
+        <p:nvSpPr>
+          <p:cNvPr id="53" name="テキスト ボックス 52"/>
+          <p:cNvSpPr txBox="1"/>
+          <p:nvPr/>
+        </p:nvSpPr>
+        <p:spPr>
+          <a:xfrm>
+            <a:off x="5360188" y="1891251"/>
+            <a:ext cx="385042" cy="307777"/>
+          </a:xfrm>
+          <a:prstGeom prst="rect">
+            <a:avLst/>
+          </a:prstGeom>
+          <a:noFill/>
+        </p:spPr>
+        <p:txBody>
+          <a:bodyPr wrap="none" rtlCol="0">
+            <a:spAutoFit/>
+          </a:bodyPr>
+          <a:lstStyle/>
+          <a:p>
+            <a:r>
+              <a:rPr kumimoji="1" lang="en-US" altLang="ja-JP" sz="1400" dirty="0" smtClean="0"/>
+              <a:t>(2)</a:t>
+            </a:r>
+            <a:endParaRPr kumimoji="1" lang="ja-JP" altLang="en-US" sz="1400" dirty="0"/>
+          </a:p>
+        </p:txBody>
+      </p:sp>
+      <p:sp>
+        <p:nvSpPr>
+          <p:cNvPr id="54" name="テキスト ボックス 53"/>
+          <p:cNvSpPr txBox="1"/>
+          <p:nvPr/>
+        </p:nvSpPr>
+        <p:spPr>
+          <a:xfrm>
+            <a:off x="1926297" y="3394116"/>
+            <a:ext cx="385042" cy="307777"/>
+          </a:xfrm>
+          <a:prstGeom prst="rect">
+            <a:avLst/>
+          </a:prstGeom>
+          <a:noFill/>
+        </p:spPr>
+        <p:txBody>
+          <a:bodyPr wrap="none" rtlCol="0">
+            <a:spAutoFit/>
+          </a:bodyPr>
+          <a:lstStyle/>
+          <a:p>
+            <a:r>
+              <a:rPr kumimoji="1" lang="en-US" altLang="ja-JP" sz="1400" dirty="0" smtClean="0"/>
+              <a:t>(5)</a:t>
+            </a:r>
+            <a:endParaRPr kumimoji="1" lang="ja-JP" altLang="en-US" sz="1400" dirty="0"/>
+          </a:p>
+        </p:txBody>
+      </p:sp>
+      <p:sp>
+        <p:nvSpPr>
+          <p:cNvPr id="55" name="テキスト ボックス 54"/>
+          <p:cNvSpPr txBox="1"/>
+          <p:nvPr/>
+        </p:nvSpPr>
+        <p:spPr>
+          <a:xfrm>
+            <a:off x="2364984" y="3010609"/>
+            <a:ext cx="385042" cy="307777"/>
+          </a:xfrm>
+          <a:prstGeom prst="rect">
+            <a:avLst/>
+          </a:prstGeom>
+          <a:noFill/>
+        </p:spPr>
+        <p:txBody>
+          <a:bodyPr wrap="none" rtlCol="0">
+            <a:spAutoFit/>
+          </a:bodyPr>
+          <a:lstStyle/>
+          <a:p>
+            <a:r>
+              <a:rPr kumimoji="1" lang="en-US" altLang="ja-JP" sz="1400" dirty="0" smtClean="0"/>
+              <a:t>(4)</a:t>
+            </a:r>
+            <a:endParaRPr kumimoji="1" lang="ja-JP" altLang="en-US" sz="1400" dirty="0"/>
+          </a:p>
+        </p:txBody>
+      </p:sp>
+      <p:sp>
+        <p:nvSpPr>
+          <p:cNvPr id="56" name="テキスト ボックス 55"/>
+          <p:cNvSpPr txBox="1"/>
+          <p:nvPr/>
+        </p:nvSpPr>
+        <p:spPr>
+          <a:xfrm>
+            <a:off x="5367585" y="2787258"/>
+            <a:ext cx="385042" cy="307777"/>
+          </a:xfrm>
+          <a:prstGeom prst="rect">
+            <a:avLst/>
+          </a:prstGeom>
+          <a:noFill/>
+        </p:spPr>
+        <p:txBody>
+          <a:bodyPr wrap="none" rtlCol="0">
+            <a:spAutoFit/>
+          </a:bodyPr>
+          <a:lstStyle/>
+          <a:p>
+            <a:r>
+              <a:rPr kumimoji="1" lang="en-US" altLang="ja-JP" sz="1400" dirty="0" smtClean="0"/>
+              <a:t>(3)</a:t>
+            </a:r>
+            <a:endParaRPr kumimoji="1" lang="ja-JP" altLang="en-US" sz="1400" dirty="0"/>
+          </a:p>
+        </p:txBody>
+      </p:sp>
+      <p:sp>
+        <p:nvSpPr>
+          <p:cNvPr id="57" name="角丸四角形 56"/>
+          <p:cNvSpPr/>
+          <p:nvPr/>
+        </p:nvSpPr>
+        <p:spPr>
+          <a:xfrm>
+            <a:off x="6043466" y="2008245"/>
+            <a:ext cx="2559887" cy="981720"/>
+          </a:xfrm>
+          <a:prstGeom prst="roundRect">
+            <a:avLst/>
+          </a:prstGeom>
+        </p:spPr>
+        <p:style>
+          <a:lnRef idx="1">
+            <a:schemeClr val="accent1"/>
+          </a:lnRef>
+          <a:fillRef idx="3">
+            <a:schemeClr val="accent1"/>
+          </a:fillRef>
+          <a:effectRef idx="2">
+            <a:schemeClr val="accent1"/>
+          </a:effectRef>
+          <a:fontRef idx="minor">
+            <a:schemeClr val="lt1"/>
+          </a:fontRef>
+        </p:style>
+        <p:txBody>
+          <a:bodyPr rtlCol="0" anchor="t"/>
+          <a:lstStyle/>
+          <a:p>
+            <a:pPr algn="ctr"/>
+            <a:r>
+              <a:rPr lang="en-US" altLang="ja-JP" b="1" dirty="0" err="1" smtClean="0">
+                <a:solidFill>
+                  <a:schemeClr val="bg1"/>
+                </a:solidFill>
+                <a:effectLst>
+                  <a:outerShdw blurRad="50800" dist="38100" dir="2700000" algn="tl" rotWithShape="0">
+                    <a:prstClr val="black">
+                      <a:alpha val="40000"/>
+                    </a:prstClr>
+                  </a:outerShdw>
+                </a:effectLst>
+              </a:rPr>
+              <a:t>TodoService</a:t>
+            </a:r>
+            <a:endParaRPr lang="en-US" altLang="ja-JP" sz="1050" dirty="0"/>
+          </a:p>
+        </p:txBody>
+      </p:sp>
+      <p:sp>
+        <p:nvSpPr>
+          <p:cNvPr id="58" name="正方形/長方形 57"/>
+          <p:cNvSpPr/>
+          <p:nvPr/>
+        </p:nvSpPr>
+        <p:spPr>
+          <a:xfrm>
+            <a:off x="1783831" y="1513732"/>
+            <a:ext cx="7455362" cy="1917709"/>
+          </a:xfrm>
+          <a:prstGeom prst="rect">
+            <a:avLst/>
+          </a:prstGeom>
+          <a:noFill/>
+          <a:ln w="34925">
+            <a:prstDash val="dash"/>
+          </a:ln>
+        </p:spPr>
+        <p:style>
+          <a:lnRef idx="2">
+            <a:schemeClr val="accent4"/>
+          </a:lnRef>
+          <a:fillRef idx="1">
+            <a:schemeClr val="lt1"/>
+          </a:fillRef>
+          <a:effectRef idx="0">
+            <a:schemeClr val="accent4"/>
+          </a:effectRef>
+          <a:fontRef idx="minor">
+            <a:schemeClr val="dk1"/>
+          </a:fontRef>
+        </p:style>
+        <p:txBody>
+          <a:bodyPr rtlCol="0" anchor="ctr"/>
+          <a:lstStyle/>
+          <a:p>
+            <a:pPr algn="ctr"/>
+            <a:endParaRPr kumimoji="1" lang="ja-JP" altLang="en-US"/>
+          </a:p>
+        </p:txBody>
+      </p:sp>
+      <p:sp>
+        <p:nvSpPr>
+          <p:cNvPr id="59" name="正方形/長方形 58"/>
+          <p:cNvSpPr/>
+          <p:nvPr/>
+        </p:nvSpPr>
+        <p:spPr>
+          <a:xfrm>
+            <a:off x="5766218" y="1770764"/>
+            <a:ext cx="3154239" cy="1440313"/>
+          </a:xfrm>
+          <a:prstGeom prst="rect">
+            <a:avLst/>
+          </a:prstGeom>
+          <a:noFill/>
+          <a:ln w="34925">
+            <a:prstDash val="dash"/>
+          </a:ln>
+        </p:spPr>
+        <p:style>
+          <a:lnRef idx="2">
+            <a:schemeClr val="accent1"/>
+          </a:lnRef>
+          <a:fillRef idx="1">
+            <a:schemeClr val="lt1"/>
+          </a:fillRef>
+          <a:effectRef idx="0">
+            <a:schemeClr val="accent1"/>
+          </a:effectRef>
+          <a:fontRef idx="minor">
+            <a:schemeClr val="dk1"/>
+          </a:fontRef>
+        </p:style>
+        <p:txBody>
+          <a:bodyPr rtlCol="0" anchor="ctr"/>
+          <a:lstStyle/>
+          <a:p>
+            <a:pPr algn="ctr"/>
+            <a:endParaRPr kumimoji="1" lang="ja-JP" altLang="en-US"/>
+          </a:p>
+        </p:txBody>
+      </p:sp>
+      <p:cxnSp>
+        <p:nvCxnSpPr>
+          <p:cNvPr id="61" name="直線矢印コネクタ 60"/>
           <p:cNvCxnSpPr/>
           <p:nvPr/>
         </p:nvCxnSpPr>
         <p:spPr>
           <a:xfrm flipV="1">
-            <a:off x="3217739" y="2571528"/>
-            <a:ext cx="1141479" cy="1640"/>
+            <a:off x="5356395" y="2199028"/>
+            <a:ext cx="687071" cy="3427"/>
+          </a:xfrm>
+          <a:prstGeom prst="straightConnector1">
+            <a:avLst/>
+          </a:prstGeom>
+          <a:ln>
+            <a:tailEnd type="arrow"/>
+          </a:ln>
+        </p:spPr>
+        <p:style>
+          <a:lnRef idx="2">
+            <a:schemeClr val="accent1"/>
+          </a:lnRef>
+          <a:fillRef idx="0">
+            <a:schemeClr val="accent1"/>
+          </a:fillRef>
+          <a:effectRef idx="1">
+            <a:schemeClr val="accent1"/>
+          </a:effectRef>
+          <a:fontRef idx="minor">
+            <a:schemeClr val="tx1"/>
+          </a:fontRef>
+        </p:style>
+      </p:cxnSp>
+      <p:cxnSp>
+        <p:nvCxnSpPr>
+          <p:cNvPr id="62" name="直線矢印コネクタ 61"/>
+          <p:cNvCxnSpPr/>
+          <p:nvPr/>
+        </p:nvCxnSpPr>
+        <p:spPr>
+          <a:xfrm>
+            <a:off x="5340982" y="2771829"/>
+            <a:ext cx="702484" cy="0"/>
           </a:xfrm>
           <a:prstGeom prst="straightConnector1">
             <a:avLst/>
@@ -17082,238 +17734,71 @@
       </p:cxnSp>
       <p:sp>
         <p:nvSpPr>
-          <p:cNvPr id="52" name="テキスト ボックス 51"/>
-          <p:cNvSpPr txBox="1"/>
+          <p:cNvPr id="63" name="星 24 62"/>
+          <p:cNvSpPr/>
           <p:nvPr/>
         </p:nvSpPr>
         <p:spPr>
           <a:xfrm>
-            <a:off x="4292916" y="1641157"/>
-            <a:ext cx="2297424" cy="1107996"/>
+            <a:off x="2569839" y="2975619"/>
+            <a:ext cx="1112438" cy="555462"/>
+          </a:xfrm>
+          <a:prstGeom prst="star24">
+            <a:avLst/>
+          </a:prstGeom>
+        </p:spPr>
+        <p:style>
+          <a:lnRef idx="1">
+            <a:schemeClr val="accent2"/>
+          </a:lnRef>
+          <a:fillRef idx="3">
+            <a:schemeClr val="accent2"/>
+          </a:fillRef>
+          <a:effectRef idx="2">
+            <a:schemeClr val="accent2"/>
+          </a:effectRef>
+          <a:fontRef idx="minor">
+            <a:schemeClr val="lt1"/>
+          </a:fontRef>
+        </p:style>
+        <p:txBody>
+          <a:bodyPr rtlCol="0" anchor="ctr"/>
+          <a:lstStyle/>
+          <a:p>
+            <a:pPr algn="ctr"/>
+            <a:endParaRPr kumimoji="1" lang="ja-JP" altLang="en-US" sz="1100" dirty="0"/>
+          </a:p>
+        </p:txBody>
+      </p:sp>
+      <p:sp>
+        <p:nvSpPr>
+          <p:cNvPr id="64" name="正方形/長方形 63"/>
+          <p:cNvSpPr/>
+          <p:nvPr/>
+        </p:nvSpPr>
+        <p:spPr>
+          <a:xfrm>
+            <a:off x="2642703" y="3115462"/>
+            <a:ext cx="927601" cy="291101"/>
           </a:xfrm>
           <a:prstGeom prst="rect">
             <a:avLst/>
           </a:prstGeom>
           <a:noFill/>
-        </p:spPr>
-        <p:txBody>
-          <a:bodyPr wrap="none" rtlCol="0">
-            <a:spAutoFit/>
-          </a:bodyPr>
-          <a:lstStyle/>
-          <a:p>
-            <a:r>
-              <a:rPr lang="en-US" altLang="ja-JP" sz="1100" dirty="0" smtClean="0"/>
-              <a:t>@JmsListener(…)</a:t>
-            </a:r>
-          </a:p>
-          <a:p>
-            <a:r>
-              <a:rPr lang="en-US" altLang="ja-JP" sz="1100" dirty="0" smtClean="0"/>
-              <a:t>public void receiveTodo(Todo </a:t>
-            </a:r>
-            <a:r>
-              <a:rPr lang="en-US" altLang="ja-JP" sz="1100" dirty="0"/>
-              <a:t>todo) {</a:t>
-            </a:r>
-          </a:p>
-          <a:p>
-            <a:r>
-              <a:rPr lang="en-US" altLang="ja-JP" sz="1100" dirty="0" smtClean="0"/>
-              <a:t>    // omitted</a:t>
-            </a:r>
-          </a:p>
-          <a:p>
-            <a:r>
-              <a:rPr lang="en-US" altLang="ja-JP" sz="1100" dirty="0" smtClean="0"/>
-              <a:t>    todoService.insertTodo(todo)</a:t>
-            </a:r>
-          </a:p>
-          <a:p>
-            <a:r>
-              <a:rPr lang="en-US" altLang="ja-JP" sz="1100" dirty="0" smtClean="0"/>
-              <a:t>    // </a:t>
-            </a:r>
-            <a:r>
-              <a:rPr lang="en-US" altLang="ja-JP" sz="1100" dirty="0"/>
-              <a:t>omitted</a:t>
-            </a:r>
-          </a:p>
-          <a:p>
-            <a:r>
-              <a:rPr lang="en-US" altLang="ja-JP" sz="1100" dirty="0" smtClean="0"/>
-              <a:t>}</a:t>
-            </a:r>
-            <a:endParaRPr kumimoji="1" lang="ja-JP" altLang="en-US" sz="1100" dirty="0"/>
-          </a:p>
-        </p:txBody>
-      </p:sp>
-      <p:grpSp>
-        <p:nvGrpSpPr>
-          <p:cNvPr id="27" name="グループ化 26"/>
-          <p:cNvGrpSpPr/>
-          <p:nvPr/>
-        </p:nvGrpSpPr>
-        <p:grpSpPr>
-          <a:xfrm>
-            <a:off x="2217274" y="2181064"/>
-            <a:ext cx="1112438" cy="555462"/>
-            <a:chOff x="5775544" y="3053452"/>
-            <a:chExt cx="1112438" cy="555462"/>
-          </a:xfrm>
-        </p:grpSpPr>
-        <p:sp>
-          <p:nvSpPr>
-            <p:cNvPr id="28" name="星 24 27"/>
-            <p:cNvSpPr/>
-            <p:nvPr/>
-          </p:nvSpPr>
-          <p:spPr>
-            <a:xfrm>
-              <a:off x="5775544" y="3053452"/>
-              <a:ext cx="1112438" cy="555462"/>
-            </a:xfrm>
-            <a:prstGeom prst="star24">
-              <a:avLst/>
-            </a:prstGeom>
-          </p:spPr>
-          <p:style>
-            <a:lnRef idx="1">
-              <a:schemeClr val="accent2"/>
-            </a:lnRef>
-            <a:fillRef idx="3">
-              <a:schemeClr val="accent2"/>
-            </a:fillRef>
-            <a:effectRef idx="2">
-              <a:schemeClr val="accent2"/>
-            </a:effectRef>
-            <a:fontRef idx="minor">
-              <a:schemeClr val="lt1"/>
-            </a:fontRef>
-          </p:style>
-          <p:txBody>
-            <a:bodyPr rtlCol="0" anchor="ctr"/>
-            <a:lstStyle/>
-            <a:p>
-              <a:pPr algn="ctr"/>
-              <a:endParaRPr kumimoji="1" lang="ja-JP" altLang="en-US" sz="1100" dirty="0"/>
-            </a:p>
-          </p:txBody>
-        </p:sp>
-        <p:sp>
-          <p:nvSpPr>
-            <p:cNvPr id="30" name="正方形/長方形 29"/>
-            <p:cNvSpPr/>
-            <p:nvPr/>
-          </p:nvSpPr>
-          <p:spPr>
-            <a:xfrm>
-              <a:off x="5848408" y="3193295"/>
-              <a:ext cx="927601" cy="291101"/>
-            </a:xfrm>
-            <a:prstGeom prst="rect">
-              <a:avLst/>
-            </a:prstGeom>
+          <a:ln>
             <a:noFill/>
-            <a:ln>
-              <a:noFill/>
-            </a:ln>
-          </p:spPr>
-          <p:style>
-            <a:lnRef idx="2">
-              <a:schemeClr val="accent1">
-                <a:shade val="50000"/>
-              </a:schemeClr>
-            </a:lnRef>
-            <a:fillRef idx="1">
-              <a:schemeClr val="accent1"/>
-            </a:fillRef>
-            <a:effectRef idx="0">
-              <a:schemeClr val="accent1"/>
-            </a:effectRef>
-            <a:fontRef idx="minor">
-              <a:schemeClr val="lt1"/>
-            </a:fontRef>
-          </p:style>
-          <p:txBody>
-            <a:bodyPr rtlCol="0" anchor="ctr"/>
-            <a:lstStyle/>
-            <a:p>
-              <a:pPr algn="ctr"/>
-              <a:r>
-                <a:rPr lang="en-US" altLang="ja-JP" sz="1200" dirty="0">
-                  <a:solidFill>
-                    <a:schemeClr val="bg1"/>
-                  </a:solidFill>
-                </a:rPr>
-                <a:t>Unexpected Error</a:t>
-              </a:r>
-              <a:endParaRPr kumimoji="1" lang="ja-JP" altLang="en-US" sz="1200" dirty="0">
-                <a:solidFill>
-                  <a:schemeClr val="bg1"/>
-                </a:solidFill>
-              </a:endParaRPr>
-            </a:p>
-          </p:txBody>
-        </p:sp>
-      </p:grpSp>
-      <p:cxnSp>
-        <p:nvCxnSpPr>
-          <p:cNvPr id="22" name="直線矢印コネクタ 21"/>
-          <p:cNvCxnSpPr/>
-          <p:nvPr/>
-        </p:nvCxnSpPr>
-        <p:spPr>
-          <a:xfrm flipH="1" flipV="1">
-            <a:off x="2033006" y="2563298"/>
-            <a:ext cx="299845" cy="8230"/>
-          </a:xfrm>
-          <a:prstGeom prst="straightConnector1">
-            <a:avLst/>
-          </a:prstGeom>
-          <a:ln>
-            <a:prstDash val="sysDash"/>
-            <a:tailEnd type="arrow"/>
           </a:ln>
         </p:spPr>
         <p:style>
           <a:lnRef idx="2">
-            <a:schemeClr val="accent1"/>
+            <a:schemeClr val="accent1">
+              <a:shade val="50000"/>
+            </a:schemeClr>
           </a:lnRef>
-          <a:fillRef idx="0">
+          <a:fillRef idx="1">
             <a:schemeClr val="accent1"/>
           </a:fillRef>
-          <a:effectRef idx="1">
-            <a:schemeClr val="accent1"/>
-          </a:effectRef>
-          <a:fontRef idx="minor">
-            <a:schemeClr val="tx1"/>
-          </a:fontRef>
-        </p:style>
-      </p:cxnSp>
-      <p:sp>
-        <p:nvSpPr>
-          <p:cNvPr id="26" name="角丸四角形 25"/>
-          <p:cNvSpPr/>
-          <p:nvPr/>
-        </p:nvSpPr>
-        <p:spPr>
-          <a:xfrm>
-            <a:off x="349250" y="1931421"/>
-            <a:ext cx="1690907" cy="759832"/>
-          </a:xfrm>
-          <a:prstGeom prst="roundRect">
-            <a:avLst/>
-          </a:prstGeom>
-        </p:spPr>
-        <p:style>
-          <a:lnRef idx="1">
-            <a:schemeClr val="accent1"/>
-          </a:lnRef>
-          <a:fillRef idx="3">
-            <a:schemeClr val="accent1"/>
-          </a:fillRef>
-          <a:effectRef idx="2">
+          <a:effectRef idx="0">
             <a:schemeClr val="accent1"/>
           </a:effectRef>
           <a:fontRef idx="minor">
@@ -17326,329 +17811,16 @@
           <a:p>
             <a:pPr algn="ctr"/>
             <a:r>
-              <a:rPr kumimoji="1" lang="en-US" altLang="ja-JP" sz="1100" dirty="0" smtClean="0"/>
-              <a:t>DefaultMessageListener</a:t>
-            </a:r>
-          </a:p>
-          <a:p>
-            <a:pPr algn="ctr"/>
-            <a:r>
-              <a:rPr kumimoji="1" lang="en-US" altLang="ja-JP" sz="1100" dirty="0" smtClean="0"/>
-              <a:t>Container</a:t>
-            </a:r>
-            <a:endParaRPr kumimoji="1" lang="ja-JP" altLang="en-US" sz="1100" dirty="0"/>
-          </a:p>
-        </p:txBody>
-      </p:sp>
-      <p:sp>
-        <p:nvSpPr>
-          <p:cNvPr id="23" name="テキスト ボックス 22"/>
-          <p:cNvSpPr txBox="1"/>
-          <p:nvPr/>
-        </p:nvSpPr>
-        <p:spPr>
-          <a:xfrm>
-            <a:off x="2027672" y="1810267"/>
-            <a:ext cx="385042" cy="307777"/>
-          </a:xfrm>
-          <a:prstGeom prst="rect">
-            <a:avLst/>
-          </a:prstGeom>
-          <a:noFill/>
-        </p:spPr>
-        <p:txBody>
-          <a:bodyPr wrap="none" rtlCol="0">
-            <a:spAutoFit/>
-          </a:bodyPr>
-          <a:lstStyle/>
-          <a:p>
-            <a:r>
-              <a:rPr kumimoji="1" lang="en-US" altLang="ja-JP" sz="1400" dirty="0" smtClean="0"/>
-              <a:t>(1)</a:t>
-            </a:r>
-            <a:endParaRPr kumimoji="1" lang="ja-JP" altLang="en-US" sz="1400" dirty="0"/>
-          </a:p>
-        </p:txBody>
-      </p:sp>
-      <p:sp>
-        <p:nvSpPr>
-          <p:cNvPr id="32" name="テキスト ボックス 31"/>
-          <p:cNvSpPr txBox="1"/>
-          <p:nvPr/>
-        </p:nvSpPr>
-        <p:spPr>
-          <a:xfrm>
-            <a:off x="3866318" y="1787674"/>
-            <a:ext cx="385042" cy="307777"/>
-          </a:xfrm>
-          <a:prstGeom prst="rect">
-            <a:avLst/>
-          </a:prstGeom>
-          <a:noFill/>
-        </p:spPr>
-        <p:txBody>
-          <a:bodyPr wrap="none" rtlCol="0">
-            <a:spAutoFit/>
-          </a:bodyPr>
-          <a:lstStyle/>
-          <a:p>
-            <a:r>
-              <a:rPr kumimoji="1" lang="en-US" altLang="ja-JP" sz="1400" dirty="0" smtClean="0"/>
-              <a:t>(2)</a:t>
-            </a:r>
-            <a:endParaRPr kumimoji="1" lang="ja-JP" altLang="en-US" sz="1400" dirty="0"/>
-          </a:p>
-        </p:txBody>
-      </p:sp>
-      <p:sp>
-        <p:nvSpPr>
-          <p:cNvPr id="33" name="テキスト ボックス 32"/>
-          <p:cNvSpPr txBox="1"/>
-          <p:nvPr/>
-        </p:nvSpPr>
-        <p:spPr>
-          <a:xfrm>
-            <a:off x="5319922" y="1956225"/>
-            <a:ext cx="385042" cy="307777"/>
-          </a:xfrm>
-          <a:prstGeom prst="rect">
-            <a:avLst/>
-          </a:prstGeom>
-          <a:noFill/>
-        </p:spPr>
-        <p:txBody>
-          <a:bodyPr wrap="none" rtlCol="0">
-            <a:spAutoFit/>
-          </a:bodyPr>
-          <a:lstStyle/>
-          <a:p>
-            <a:r>
-              <a:rPr kumimoji="1" lang="en-US" altLang="ja-JP" sz="1400" dirty="0" smtClean="0"/>
-              <a:t>(3)</a:t>
-            </a:r>
-            <a:endParaRPr kumimoji="1" lang="ja-JP" altLang="en-US" sz="1400" dirty="0"/>
-          </a:p>
-        </p:txBody>
-      </p:sp>
-      <p:sp>
-        <p:nvSpPr>
-          <p:cNvPr id="34" name="テキスト ボックス 33"/>
-          <p:cNvSpPr txBox="1"/>
-          <p:nvPr/>
-        </p:nvSpPr>
-        <p:spPr>
-          <a:xfrm>
-            <a:off x="2027672" y="2299709"/>
-            <a:ext cx="385042" cy="307777"/>
-          </a:xfrm>
-          <a:prstGeom prst="rect">
-            <a:avLst/>
-          </a:prstGeom>
-          <a:noFill/>
-        </p:spPr>
-        <p:txBody>
-          <a:bodyPr wrap="none" rtlCol="0">
-            <a:spAutoFit/>
-          </a:bodyPr>
-          <a:lstStyle/>
-          <a:p>
-            <a:r>
-              <a:rPr kumimoji="1" lang="en-US" altLang="ja-JP" sz="1400" dirty="0" smtClean="0"/>
-              <a:t>(6)</a:t>
-            </a:r>
-            <a:endParaRPr kumimoji="1" lang="ja-JP" altLang="en-US" sz="1400" dirty="0"/>
-          </a:p>
-        </p:txBody>
-      </p:sp>
-      <p:sp>
-        <p:nvSpPr>
-          <p:cNvPr id="35" name="テキスト ボックス 34"/>
-          <p:cNvSpPr txBox="1"/>
-          <p:nvPr/>
-        </p:nvSpPr>
-        <p:spPr>
-          <a:xfrm>
-            <a:off x="3866318" y="2304764"/>
-            <a:ext cx="385042" cy="307777"/>
-          </a:xfrm>
-          <a:prstGeom prst="rect">
-            <a:avLst/>
-          </a:prstGeom>
-          <a:noFill/>
-        </p:spPr>
-        <p:txBody>
-          <a:bodyPr wrap="none" rtlCol="0">
-            <a:spAutoFit/>
-          </a:bodyPr>
-          <a:lstStyle/>
-          <a:p>
-            <a:r>
-              <a:rPr kumimoji="1" lang="en-US" altLang="ja-JP" sz="1400" dirty="0" smtClean="0"/>
-              <a:t>(4)</a:t>
-            </a:r>
-            <a:endParaRPr kumimoji="1" lang="ja-JP" altLang="en-US" sz="1400" dirty="0"/>
-          </a:p>
-        </p:txBody>
-      </p:sp>
-      <p:sp>
-        <p:nvSpPr>
-          <p:cNvPr id="36" name="テキスト ボックス 35"/>
-          <p:cNvSpPr txBox="1"/>
-          <p:nvPr/>
-        </p:nvSpPr>
-        <p:spPr>
-          <a:xfrm>
-            <a:off x="2388451" y="2071167"/>
-            <a:ext cx="385042" cy="307777"/>
-          </a:xfrm>
-          <a:prstGeom prst="rect">
-            <a:avLst/>
-          </a:prstGeom>
-          <a:noFill/>
-        </p:spPr>
-        <p:txBody>
-          <a:bodyPr wrap="none" rtlCol="0">
-            <a:spAutoFit/>
-          </a:bodyPr>
-          <a:lstStyle/>
-          <a:p>
-            <a:r>
-              <a:rPr kumimoji="1" lang="en-US" altLang="ja-JP" sz="1400" dirty="0" smtClean="0"/>
-              <a:t>(5)</a:t>
-            </a:r>
-            <a:endParaRPr kumimoji="1" lang="ja-JP" altLang="en-US" sz="1400" dirty="0"/>
-          </a:p>
-        </p:txBody>
-      </p:sp>
-      <p:sp>
-        <p:nvSpPr>
-          <p:cNvPr id="25" name="テキスト ボックス 24"/>
-          <p:cNvSpPr txBox="1"/>
-          <p:nvPr/>
-        </p:nvSpPr>
-        <p:spPr>
-          <a:xfrm>
-            <a:off x="3401508" y="1135168"/>
-            <a:ext cx="1320440" cy="430887"/>
-          </a:xfrm>
-          <a:prstGeom prst="rect">
-            <a:avLst/>
-          </a:prstGeom>
-          <a:noFill/>
-          <a:ln>
-            <a:noFill/>
-          </a:ln>
-        </p:spPr>
-        <p:txBody>
-          <a:bodyPr vert="horz" wrap="square" rtlCol="0">
-            <a:spAutoFit/>
-          </a:bodyPr>
-          <a:lstStyle/>
-          <a:p>
-            <a:r>
-              <a:rPr kumimoji="1" lang="en-US" altLang="ja-JP" sz="1100" dirty="0" smtClean="0">
+              <a:rPr lang="en-US" altLang="ja-JP" sz="1200" dirty="0">
                 <a:solidFill>
-                  <a:schemeClr val="accent1"/>
+                  <a:schemeClr val="bg1"/>
                 </a:solidFill>
               </a:rPr>
-              <a:t>DB</a:t>
-            </a:r>
-            <a:r>
-              <a:rPr lang="ja-JP" altLang="en-US" sz="1100" dirty="0">
-                <a:solidFill>
-                  <a:schemeClr val="accent1"/>
-                </a:solidFill>
-              </a:rPr>
-              <a:t> </a:t>
-            </a:r>
-            <a:r>
-              <a:rPr lang="en-US" altLang="ja-JP" sz="1100" dirty="0" smtClean="0">
-                <a:solidFill>
-                  <a:schemeClr val="accent1"/>
-                </a:solidFill>
-              </a:rPr>
-              <a:t>Transaction</a:t>
-            </a:r>
-          </a:p>
-          <a:p>
-            <a:r>
-              <a:rPr lang="en-US" altLang="ja-JP" sz="1100" dirty="0" smtClean="0">
-                <a:solidFill>
-                  <a:schemeClr val="accent1"/>
-                </a:solidFill>
-              </a:rPr>
-              <a:t>Boundary</a:t>
-            </a:r>
-            <a:endParaRPr lang="ja-JP" altLang="en-US" sz="1100" dirty="0">
+              <a:t>Unexpected Error</a:t>
+            </a:r>
+            <a:endParaRPr kumimoji="1" lang="ja-JP" altLang="en-US" sz="1200" dirty="0">
               <a:solidFill>
-                <a:schemeClr val="accent1"/>
-              </a:solidFill>
-            </a:endParaRPr>
-          </a:p>
-        </p:txBody>
-      </p:sp>
-      <p:sp>
-        <p:nvSpPr>
-          <p:cNvPr id="37" name="テキスト ボックス 36"/>
-          <p:cNvSpPr txBox="1"/>
-          <p:nvPr/>
-        </p:nvSpPr>
-        <p:spPr>
-          <a:xfrm>
-            <a:off x="1556110" y="1103707"/>
-            <a:ext cx="1320440" cy="430887"/>
-          </a:xfrm>
-          <a:prstGeom prst="rect">
-            <a:avLst/>
-          </a:prstGeom>
-          <a:noFill/>
-          <a:ln>
-            <a:noFill/>
-          </a:ln>
-        </p:spPr>
-        <p:txBody>
-          <a:bodyPr vert="horz" wrap="square" rtlCol="0">
-            <a:spAutoFit/>
-          </a:bodyPr>
-          <a:lstStyle/>
-          <a:p>
-            <a:r>
-              <a:rPr lang="en-US" altLang="ja-JP" sz="1100" dirty="0" smtClean="0">
-                <a:solidFill>
-                  <a:srgbClr val="7030A0"/>
-                </a:solidFill>
-              </a:rPr>
-              <a:t>JMS</a:t>
-            </a:r>
-            <a:r>
-              <a:rPr kumimoji="1" lang="ja-JP" altLang="en-US" sz="1100" dirty="0" smtClean="0">
-                <a:solidFill>
-                  <a:srgbClr val="7030A0"/>
-                </a:solidFill>
-              </a:rPr>
-              <a:t> </a:t>
-            </a:r>
-            <a:r>
-              <a:rPr kumimoji="1" lang="en-US" altLang="ja-JP" sz="1100" dirty="0" smtClean="0">
-                <a:solidFill>
-                  <a:srgbClr val="7030A0"/>
-                </a:solidFill>
-              </a:rPr>
-              <a:t>Transaction </a:t>
-            </a:r>
-          </a:p>
-          <a:p>
-            <a:r>
-              <a:rPr lang="en-US" altLang="ja-JP" sz="1100" dirty="0" smtClean="0">
-                <a:solidFill>
-                  <a:srgbClr val="7030A0"/>
-                </a:solidFill>
-              </a:rPr>
-              <a:t>Boundary</a:t>
-            </a:r>
-            <a:endParaRPr kumimoji="1" lang="ja-JP" altLang="en-US" sz="1100" dirty="0">
-              <a:solidFill>
-                <a:srgbClr val="7030A0"/>
+                <a:schemeClr val="bg1"/>
               </a:solidFill>
             </a:endParaRPr>
           </a:p>

</xml_diff>